<commit_message>
slides have comments from colleagues
</commit_message>
<xml_diff>
--- a/slides/11.26.12 Quals (v1c).pptx
+++ b/slides/11.26.12 Quals (v1c).pptx
@@ -305,11 +305,11 @@
           </c:yVal>
           <c:smooth val="1"/>
         </c:ser>
-        <c:axId val="614536296"/>
-        <c:axId val="614338792"/>
+        <c:axId val="391744296"/>
+        <c:axId val="391315448"/>
       </c:scatterChart>
       <c:valAx>
-        <c:axId val="614536296"/>
+        <c:axId val="391744296"/>
         <c:scaling>
           <c:orientation val="minMax"/>
         </c:scaling>
@@ -334,12 +334,12 @@
         </c:title>
         <c:numFmt formatCode="General" sourceLinked="1"/>
         <c:tickLblPos val="nextTo"/>
-        <c:crossAx val="614338792"/>
+        <c:crossAx val="391315448"/>
         <c:crosses val="autoZero"/>
         <c:crossBetween val="midCat"/>
       </c:valAx>
       <c:valAx>
-        <c:axId val="614338792"/>
+        <c:axId val="391315448"/>
         <c:scaling>
           <c:orientation val="minMax"/>
         </c:scaling>
@@ -365,7 +365,7 @@
         </c:title>
         <c:numFmt formatCode="General" sourceLinked="1"/>
         <c:tickLblPos val="nextTo"/>
-        <c:crossAx val="614536296"/>
+        <c:crossAx val="391744296"/>
         <c:crosses val="autoZero"/>
         <c:crossBetween val="midCat"/>
       </c:valAx>
@@ -513,8 +513,8 @@
           </c:yVal>
           <c:smooth val="1"/>
         </c:ser>
-        <c:axId val="614444008"/>
-        <c:axId val="614389480"/>
+        <c:axId val="391928584"/>
+        <c:axId val="391944024"/>
       </c:scatterChart>
       <c:scatterChart>
         <c:scatterStyle val="smoothMarker"/>
@@ -649,11 +649,11 @@
           </c:yVal>
           <c:smooth val="1"/>
         </c:ser>
-        <c:axId val="614600744"/>
-        <c:axId val="614306632"/>
+        <c:axId val="480873384"/>
+        <c:axId val="557903848"/>
       </c:scatterChart>
       <c:valAx>
-        <c:axId val="614444008"/>
+        <c:axId val="391928584"/>
         <c:scaling>
           <c:orientation val="minMax"/>
         </c:scaling>
@@ -678,12 +678,12 @@
         </c:title>
         <c:numFmt formatCode="General" sourceLinked="1"/>
         <c:tickLblPos val="nextTo"/>
-        <c:crossAx val="614389480"/>
+        <c:crossAx val="391944024"/>
         <c:crosses val="autoZero"/>
         <c:crossBetween val="midCat"/>
       </c:valAx>
       <c:valAx>
-        <c:axId val="614389480"/>
+        <c:axId val="391944024"/>
         <c:scaling>
           <c:orientation val="minMax"/>
         </c:scaling>
@@ -709,12 +709,12 @@
         </c:title>
         <c:numFmt formatCode="0.00%" sourceLinked="1"/>
         <c:tickLblPos val="nextTo"/>
-        <c:crossAx val="614444008"/>
+        <c:crossAx val="391928584"/>
         <c:crosses val="autoZero"/>
         <c:crossBetween val="midCat"/>
       </c:valAx>
       <c:valAx>
-        <c:axId val="614306632"/>
+        <c:axId val="557903848"/>
         <c:scaling>
           <c:orientation val="minMax"/>
         </c:scaling>
@@ -739,12 +739,12 @@
         </c:title>
         <c:numFmt formatCode="0.00%" sourceLinked="1"/>
         <c:tickLblPos val="nextTo"/>
-        <c:crossAx val="614600744"/>
+        <c:crossAx val="480873384"/>
         <c:crosses val="max"/>
         <c:crossBetween val="midCat"/>
       </c:valAx>
       <c:valAx>
-        <c:axId val="614600744"/>
+        <c:axId val="480873384"/>
         <c:scaling>
           <c:orientation val="minMax"/>
         </c:scaling>
@@ -752,7 +752,7 @@
         <c:axPos val="b"/>
         <c:numFmt formatCode="General" sourceLinked="1"/>
         <c:tickLblPos val="nextTo"/>
-        <c:crossAx val="614306632"/>
+        <c:crossAx val="557903848"/>
         <c:crosses val="autoZero"/>
         <c:crossBetween val="midCat"/>
       </c:valAx>
@@ -1011,7 +1011,7 @@
                   <c:v>84.61668641056015</c:v>
                 </c:pt>
                 <c:pt idx="4">
-                  <c:v>77.6880049720323</c:v>
+                  <c:v>77.68800497203229</c:v>
                 </c:pt>
                 <c:pt idx="5">
                   <c:v>83.08408109006314</c:v>
@@ -1115,7 +1115,7 @@
                   <c:v>269.0341673392521</c:v>
                 </c:pt>
                 <c:pt idx="6">
-                  <c:v>277.0083102493074</c:v>
+                  <c:v>277.0083102493073</c:v>
                 </c:pt>
                 <c:pt idx="7">
                   <c:v>291.4602156805596</c:v>
@@ -1124,7 +1124,7 @@
                   <c:v>295.3337271116362</c:v>
                 </c:pt>
                 <c:pt idx="9">
-                  <c:v>303.4901365705613</c:v>
+                  <c:v>303.4901365705612</c:v>
                 </c:pt>
                 <c:pt idx="10">
                   <c:v>310.1736972704715</c:v>
@@ -1195,7 +1195,7 @@
                 <c:formatCode>General</c:formatCode>
                 <c:ptCount val="1"/>
                 <c:pt idx="0">
-                  <c:v>925.9259259259259</c:v>
+                  <c:v>925.9259259259258</c:v>
                 </c:pt>
               </c:numCache>
             </c:numRef>
@@ -1246,11 +1246,11 @@
           </c:yVal>
           <c:smooth val="1"/>
         </c:ser>
-        <c:axId val="614499928"/>
-        <c:axId val="614511768"/>
+        <c:axId val="481260504"/>
+        <c:axId val="555515048"/>
       </c:scatterChart>
       <c:valAx>
-        <c:axId val="614499928"/>
+        <c:axId val="481260504"/>
         <c:scaling>
           <c:logBase val="10.0"/>
           <c:orientation val="minMax"/>
@@ -1279,12 +1279,12 @@
         <c:numFmt formatCode="General" sourceLinked="1"/>
         <c:minorTickMark val="in"/>
         <c:tickLblPos val="nextTo"/>
-        <c:crossAx val="614511768"/>
+        <c:crossAx val="555515048"/>
         <c:crosses val="autoZero"/>
         <c:crossBetween val="midCat"/>
       </c:valAx>
       <c:valAx>
-        <c:axId val="614511768"/>
+        <c:axId val="555515048"/>
         <c:scaling>
           <c:orientation val="minMax"/>
         </c:scaling>
@@ -1310,7 +1310,7 @@
         </c:title>
         <c:numFmt formatCode="General" sourceLinked="1"/>
         <c:tickLblPos val="nextTo"/>
-        <c:crossAx val="614499928"/>
+        <c:crossAx val="481260504"/>
         <c:crosses val="autoZero"/>
         <c:crossBetween val="midCat"/>
       </c:valAx>
@@ -1378,7 +1378,7 @@
                   <c:v>84.61668641056015</c:v>
                 </c:pt>
                 <c:pt idx="4">
-                  <c:v>77.6880049720323</c:v>
+                  <c:v>77.68800497203229</c:v>
                 </c:pt>
                 <c:pt idx="5">
                   <c:v>83.08408109006314</c:v>
@@ -1482,7 +1482,7 @@
                   <c:v>269.0341673392521</c:v>
                 </c:pt>
                 <c:pt idx="6">
-                  <c:v>277.0083102493074</c:v>
+                  <c:v>277.0083102493073</c:v>
                 </c:pt>
                 <c:pt idx="7">
                   <c:v>291.4602156805596</c:v>
@@ -1491,7 +1491,7 @@
                   <c:v>295.3337271116362</c:v>
                 </c:pt>
                 <c:pt idx="9">
-                  <c:v>303.4901365705613</c:v>
+                  <c:v>303.4901365705612</c:v>
                 </c:pt>
                 <c:pt idx="10">
                   <c:v>310.1736972704715</c:v>
@@ -1562,7 +1562,7 @@
                 <c:formatCode>General</c:formatCode>
                 <c:ptCount val="1"/>
                 <c:pt idx="0">
-                  <c:v>925.9259259259259</c:v>
+                  <c:v>925.9259259259258</c:v>
                 </c:pt>
               </c:numCache>
             </c:numRef>
@@ -1613,11 +1613,11 @@
           </c:yVal>
           <c:smooth val="1"/>
         </c:ser>
-        <c:axId val="614372632"/>
-        <c:axId val="614733496"/>
+        <c:axId val="555183400"/>
+        <c:axId val="481053416"/>
       </c:scatterChart>
       <c:valAx>
-        <c:axId val="614372632"/>
+        <c:axId val="555183400"/>
         <c:scaling>
           <c:logBase val="10.0"/>
           <c:orientation val="minMax"/>
@@ -1646,12 +1646,12 @@
         <c:numFmt formatCode="General" sourceLinked="1"/>
         <c:minorTickMark val="in"/>
         <c:tickLblPos val="nextTo"/>
-        <c:crossAx val="614733496"/>
+        <c:crossAx val="481053416"/>
         <c:crosses val="autoZero"/>
         <c:crossBetween val="midCat"/>
       </c:valAx>
       <c:valAx>
-        <c:axId val="614733496"/>
+        <c:axId val="481053416"/>
         <c:scaling>
           <c:orientation val="minMax"/>
         </c:scaling>
@@ -1677,7 +1677,7 @@
         </c:title>
         <c:numFmt formatCode="General" sourceLinked="1"/>
         <c:tickLblPos val="nextTo"/>
-        <c:crossAx val="614372632"/>
+        <c:crossAx val="555183400"/>
         <c:crosses val="autoZero"/>
         <c:crossBetween val="midCat"/>
       </c:valAx>
@@ -1746,7 +1746,7 @@
                   <c:v>15.33389557617113</c:v>
                 </c:pt>
                 <c:pt idx="2">
-                  <c:v>18.46892603195119</c:v>
+                  <c:v>18.46892603195118</c:v>
                 </c:pt>
                 <c:pt idx="3">
                   <c:v>21.36067499732992</c:v>
@@ -1776,10 +1776,10 @@
                   <c:v>59.93407252022775</c:v>
                 </c:pt>
                 <c:pt idx="12">
-                  <c:v>69.12283127116874</c:v>
+                  <c:v>69.12283127116872</c:v>
                 </c:pt>
                 <c:pt idx="13">
-                  <c:v>81.47967082212976</c:v>
+                  <c:v>81.47967082212973</c:v>
                 </c:pt>
                 <c:pt idx="14">
                   <c:v>77.724234416291</c:v>
@@ -1862,7 +1862,7 @@
                 <c:formatCode>General</c:formatCode>
                 <c:ptCount val="1"/>
                 <c:pt idx="0">
-                  <c:v>925.9259259259253</c:v>
+                  <c:v>925.9259259259252</c:v>
                 </c:pt>
               </c:numCache>
             </c:numRef>
@@ -1913,11 +1913,11 @@
           </c:yVal>
           <c:smooth val="1"/>
         </c:ser>
-        <c:axId val="614850840"/>
-        <c:axId val="614861464"/>
+        <c:axId val="574940008"/>
+        <c:axId val="480842232"/>
       </c:scatterChart>
       <c:valAx>
-        <c:axId val="614850840"/>
+        <c:axId val="574940008"/>
         <c:scaling>
           <c:logBase val="10.0"/>
           <c:orientation val="minMax"/>
@@ -1941,16 +1941,15 @@
               </a:p>
             </c:rich>
           </c:tx>
-          <c:layout/>
         </c:title>
         <c:numFmt formatCode="General" sourceLinked="1"/>
         <c:tickLblPos val="nextTo"/>
-        <c:crossAx val="614861464"/>
+        <c:crossAx val="480842232"/>
         <c:crosses val="autoZero"/>
         <c:crossBetween val="midCat"/>
       </c:valAx>
       <c:valAx>
-        <c:axId val="614861464"/>
+        <c:axId val="480842232"/>
         <c:scaling>
           <c:orientation val="minMax"/>
         </c:scaling>
@@ -1972,18 +1971,16 @@
               </a:p>
             </c:rich>
           </c:tx>
-          <c:layout/>
         </c:title>
         <c:numFmt formatCode="0.00%" sourceLinked="1"/>
         <c:tickLblPos val="nextTo"/>
-        <c:crossAx val="614850840"/>
+        <c:crossAx val="574940008"/>
         <c:crosses val="autoZero"/>
         <c:crossBetween val="midCat"/>
       </c:valAx>
     </c:plotArea>
     <c:legend>
       <c:legendPos val="r"/>
-      <c:layout/>
     </c:legend>
     <c:plotVisOnly val="1"/>
   </c:chart>
@@ -2045,7 +2042,7 @@
                   <c:v>15.33389557617113</c:v>
                 </c:pt>
                 <c:pt idx="2">
-                  <c:v>18.46892603195119</c:v>
+                  <c:v>18.46892603195118</c:v>
                 </c:pt>
                 <c:pt idx="3">
                   <c:v>21.36067499732992</c:v>
@@ -2075,10 +2072,10 @@
                   <c:v>59.93407252022775</c:v>
                 </c:pt>
                 <c:pt idx="12">
-                  <c:v>69.12283127116874</c:v>
+                  <c:v>69.12283127116872</c:v>
                 </c:pt>
                 <c:pt idx="13">
-                  <c:v>81.47967082212976</c:v>
+                  <c:v>81.47967082212973</c:v>
                 </c:pt>
                 <c:pt idx="14">
                   <c:v>77.724234416291</c:v>
@@ -2161,7 +2158,7 @@
                 <c:formatCode>General</c:formatCode>
                 <c:ptCount val="1"/>
                 <c:pt idx="0">
-                  <c:v>925.9259259259253</c:v>
+                  <c:v>925.9259259259252</c:v>
                 </c:pt>
               </c:numCache>
             </c:numRef>
@@ -2212,11 +2209,11 @@
           </c:yVal>
           <c:smooth val="1"/>
         </c:ser>
-        <c:axId val="614782872"/>
-        <c:axId val="522959064"/>
+        <c:axId val="554863432"/>
+        <c:axId val="558778632"/>
       </c:scatterChart>
       <c:valAx>
-        <c:axId val="614782872"/>
+        <c:axId val="554863432"/>
         <c:scaling>
           <c:logBase val="10.0"/>
           <c:orientation val="minMax"/>
@@ -2240,16 +2237,15 @@
               </a:p>
             </c:rich>
           </c:tx>
-          <c:layout/>
         </c:title>
         <c:numFmt formatCode="General" sourceLinked="1"/>
         <c:tickLblPos val="nextTo"/>
-        <c:crossAx val="522959064"/>
+        <c:crossAx val="558778632"/>
         <c:crosses val="autoZero"/>
         <c:crossBetween val="midCat"/>
       </c:valAx>
       <c:valAx>
-        <c:axId val="522959064"/>
+        <c:axId val="558778632"/>
         <c:scaling>
           <c:orientation val="minMax"/>
         </c:scaling>
@@ -2271,11 +2267,10 @@
               </a:p>
             </c:rich>
           </c:tx>
-          <c:layout/>
         </c:title>
         <c:numFmt formatCode="0.0%" sourceLinked="1"/>
         <c:tickLblPos val="nextTo"/>
-        <c:crossAx val="614782872"/>
+        <c:crossAx val="554863432"/>
         <c:crosses val="autoZero"/>
         <c:crossBetween val="midCat"/>
       </c:valAx>
@@ -2369,7 +2364,7 @@
             <a:fld id="{DDF72DFD-5E78-4249-82C4-16C33D9CF524}" type="datetimeFigureOut">
               <a:rPr lang="en-US" smtClean="0"/>
               <a:pPr/>
-              <a:t>12/5/12</a:t>
+              <a:t>12/6/12</a:t>
             </a:fld>
             <a:endParaRPr lang="en-US"/>
           </a:p>
@@ -2532,7 +2527,7 @@
             <a:fld id="{275DB8CA-94BD-8D45-A455-2D119630D46C}" type="datetimeFigureOut">
               <a:rPr lang="en-US" smtClean="0"/>
               <a:pPr/>
-              <a:t>12/5/12</a:t>
+              <a:t>12/6/12</a:t>
             </a:fld>
             <a:endParaRPr lang="en-US"/>
           </a:p>
@@ -2954,10 +2949,10 @@
           <a:bodyPr/>
           <a:lstStyle/>
           <a:p>
-            <a:fld id="{D595E2EF-4AF3-F948-88CD-8E02C76C0292}" type="slidenum">
+            <a:fld id="{56D28874-1678-3448-827B-018601F8A9DB}" type="slidenum">
               <a:rPr lang="en-US" smtClean="0"/>
               <a:pPr/>
-              <a:t>15</a:t>
+              <a:t>12</a:t>
             </a:fld>
             <a:endParaRPr lang="en-US"/>
           </a:p>
@@ -3017,6 +3012,69 @@
           </a:bodyPr>
           <a:lstStyle/>
           <a:p>
+            <a:r>
+              <a:rPr lang="en-US" dirty="0" smtClean="0"/>
+              <a:t>Comes out of nowhere </a:t>
+            </a:r>
+            <a:r>
+              <a:rPr lang="en-US" dirty="0" err="1" smtClean="0"/>
+              <a:t>b/c</a:t>
+            </a:r>
+            <a:r>
+              <a:rPr lang="en-US" dirty="0" smtClean="0"/>
+              <a:t> I haven’t talked about clusters yet</a:t>
+            </a:r>
+          </a:p>
+          <a:p>
+            <a:r>
+              <a:rPr lang="en-US" dirty="0" smtClean="0"/>
+              <a:t>Could say similar regions instead</a:t>
+            </a:r>
+            <a:r>
+              <a:rPr lang="en-US" baseline="0" dirty="0" smtClean="0"/>
+              <a:t> of clusters</a:t>
+            </a:r>
+          </a:p>
+          <a:p>
+            <a:endParaRPr lang="en-US" baseline="0" dirty="0" smtClean="0"/>
+          </a:p>
+          <a:p>
+            <a:r>
+              <a:rPr lang="en-US" baseline="0" dirty="0" smtClean="0"/>
+              <a:t>TS:  Validation that we’re getting clusters the right way, </a:t>
+            </a:r>
+            <a:r>
+              <a:rPr lang="en-US" baseline="0" dirty="0" err="1" smtClean="0"/>
+              <a:t>b/c</a:t>
+            </a:r>
+            <a:r>
+              <a:rPr lang="en-US" baseline="0" dirty="0" smtClean="0"/>
+              <a:t> they explain our alignment errors</a:t>
+            </a:r>
+          </a:p>
+          <a:p>
+            <a:r>
+              <a:rPr lang="en-US" baseline="0" dirty="0" smtClean="0"/>
+              <a:t>So, maybe this should come later</a:t>
+            </a:r>
+          </a:p>
+          <a:p>
+            <a:endParaRPr lang="en-US" baseline="0" dirty="0" smtClean="0"/>
+          </a:p>
+          <a:p>
+            <a:r>
+              <a:rPr lang="en-US" baseline="0" dirty="0" smtClean="0"/>
+              <a:t>SS:  this slide feels out of order</a:t>
+            </a:r>
+          </a:p>
+          <a:p>
+            <a:endParaRPr lang="en-US" baseline="0" dirty="0" smtClean="0"/>
+          </a:p>
+          <a:p>
+            <a:r>
+              <a:rPr lang="en-US" baseline="0" dirty="0" smtClean="0"/>
+              <a:t>JT:  will clusters go away with longer reads?  Maybe there will be fewer clusters, but it won’t go away</a:t>
+            </a:r>
             <a:endParaRPr lang="en-US" dirty="0"/>
           </a:p>
         </p:txBody>
@@ -3036,10 +3094,10 @@
           <a:bodyPr/>
           <a:lstStyle/>
           <a:p>
-            <a:fld id="{D595E2EF-4AF3-F948-88CD-8E02C76C0292}" type="slidenum">
+            <a:fld id="{56D28874-1678-3448-827B-018601F8A9DB}" type="slidenum">
               <a:rPr lang="en-US" smtClean="0"/>
               <a:pPr/>
-              <a:t>17</a:t>
+              <a:t>13</a:t>
             </a:fld>
             <a:endParaRPr lang="en-US"/>
           </a:p>
@@ -3101,15 +3159,45 @@
           <a:p>
             <a:r>
               <a:rPr lang="en-US" dirty="0" smtClean="0"/>
-              <a:t>TODO:</a:t>
+              <a:t>BT:  ugly (brackets, </a:t>
+            </a:r>
+            <a:r>
+              <a:rPr lang="en-US" dirty="0" err="1" smtClean="0"/>
+              <a:t>parens</a:t>
+            </a:r>
+            <a:r>
+              <a:rPr lang="en-US" dirty="0" smtClean="0"/>
+              <a:t>,</a:t>
             </a:r>
             <a:r>
               <a:rPr lang="en-US" baseline="0" dirty="0" smtClean="0"/>
-              <a:t>  add #</a:t>
-            </a:r>
-            <a:r>
-              <a:rPr lang="en-US" baseline="0" dirty="0" err="1" smtClean="0"/>
-              <a:t>s</a:t>
+              <a:t> arrow)</a:t>
+            </a:r>
+            <a:endParaRPr lang="en-US" dirty="0" smtClean="0"/>
+          </a:p>
+          <a:p>
+            <a:r>
+              <a:rPr lang="en-US" dirty="0" smtClean="0"/>
+              <a:t>More specific on what the output is like</a:t>
+            </a:r>
+          </a:p>
+          <a:p>
+            <a:endParaRPr lang="en-US" dirty="0" smtClean="0"/>
+          </a:p>
+          <a:p>
+            <a:r>
+              <a:rPr lang="en-US" dirty="0" smtClean="0"/>
+              <a:t>MZ:  not comprehensive,</a:t>
+            </a:r>
+            <a:r>
+              <a:rPr lang="en-US" baseline="0" dirty="0" smtClean="0"/>
+              <a:t> no guarantee about output</a:t>
+            </a:r>
+          </a:p>
+          <a:p>
+            <a:r>
+              <a:rPr lang="en-US" baseline="0" dirty="0" smtClean="0"/>
+              <a:t>Ours guarantees that if things are sufficiently similar, they’ll end up together</a:t>
             </a:r>
             <a:endParaRPr lang="en-US" dirty="0"/>
           </a:p>
@@ -3133,7 +3221,7 @@
             <a:fld id="{56D28874-1678-3448-827B-018601F8A9DB}" type="slidenum">
               <a:rPr lang="en-US" smtClean="0"/>
               <a:pPr/>
-              <a:t>19</a:t>
+              <a:t>14</a:t>
             </a:fld>
             <a:endParaRPr lang="en-US"/>
           </a:p>
@@ -3195,13 +3283,13 @@
           <a:p>
             <a:r>
               <a:rPr lang="en-US" dirty="0" smtClean="0"/>
-              <a:t>Height of first bar:  39,990,220</a:t>
+              <a:t>Precede this with a definition of what clusters are</a:t>
             </a:r>
           </a:p>
           <a:p>
             <a:r>
               <a:rPr lang="en-US" dirty="0" smtClean="0"/>
-              <a:t>Height of second bar:  1672</a:t>
+              <a:t>Could say that we’re finding connected components</a:t>
             </a:r>
             <a:endParaRPr lang="en-US" dirty="0"/>
           </a:p>
@@ -3222,10 +3310,10 @@
           <a:bodyPr/>
           <a:lstStyle/>
           <a:p>
-            <a:fld id="{56D28874-1678-3448-827B-018601F8A9DB}" type="slidenum">
+            <a:fld id="{D595E2EF-4AF3-F948-88CD-8E02C76C0292}" type="slidenum">
               <a:rPr lang="en-US" smtClean="0"/>
               <a:pPr/>
-              <a:t>20</a:t>
+              <a:t>15</a:t>
             </a:fld>
             <a:endParaRPr lang="en-US"/>
           </a:p>
@@ -3285,6 +3373,20 @@
           </a:bodyPr>
           <a:lstStyle/>
           <a:p>
+            <a:r>
+              <a:rPr lang="en-US" dirty="0" smtClean="0"/>
+              <a:t>BT:  make it more clear what the extrinsic</a:t>
+            </a:r>
+            <a:r>
+              <a:rPr lang="en-US" baseline="0" dirty="0" smtClean="0"/>
+              <a:t> criteria are</a:t>
+            </a:r>
+          </a:p>
+          <a:p>
+            <a:r>
+              <a:rPr lang="en-US" baseline="0" dirty="0" smtClean="0"/>
+              <a:t>Makes it sound like I don’t have an idea for how to do it</a:t>
+            </a:r>
             <a:endParaRPr lang="en-US" dirty="0"/>
           </a:p>
         </p:txBody>
@@ -3304,10 +3406,10 @@
           <a:bodyPr/>
           <a:lstStyle/>
           <a:p>
-            <a:fld id="{D595E2EF-4AF3-F948-88CD-8E02C76C0292}" type="slidenum">
+            <a:fld id="{56D28874-1678-3448-827B-018601F8A9DB}" type="slidenum">
               <a:rPr lang="en-US" smtClean="0"/>
               <a:pPr/>
-              <a:t>23</a:t>
+              <a:t>16</a:t>
             </a:fld>
             <a:endParaRPr lang="en-US"/>
           </a:p>
@@ -3369,9 +3471,63 @@
           <a:p>
             <a:r>
               <a:rPr lang="en-US" dirty="0" smtClean="0"/>
-              <a:t>TODO:  flesh these out</a:t>
-            </a:r>
-            <a:endParaRPr lang="en-US" dirty="0"/>
+              <a:t>BT:  not clear what blue/green/red/purple mean (color</a:t>
+            </a:r>
+            <a:r>
+              <a:rPr lang="en-US" baseline="0" dirty="0" smtClean="0"/>
+              <a:t> the rest of the partitions too)</a:t>
+            </a:r>
+          </a:p>
+          <a:p>
+            <a:r>
+              <a:rPr lang="en-US" baseline="0" dirty="0" smtClean="0"/>
+              <a:t>SS/TS:  explain what N is</a:t>
+            </a:r>
+          </a:p>
+          <a:p>
+            <a:endParaRPr lang="en-US" baseline="0" dirty="0" smtClean="0"/>
+          </a:p>
+          <a:p>
+            <a:r>
+              <a:rPr lang="en-US" baseline="0" dirty="0" smtClean="0"/>
+              <a:t>Not clear what the matrix is</a:t>
+            </a:r>
+          </a:p>
+          <a:p>
+            <a:r>
+              <a:rPr lang="en-US" baseline="0" dirty="0" smtClean="0"/>
+              <a:t>Could write something like “Goal:  compute the edit distance”</a:t>
+            </a:r>
+          </a:p>
+          <a:p>
+            <a:endParaRPr lang="en-US" baseline="0" dirty="0" smtClean="0"/>
+          </a:p>
+          <a:p>
+            <a:r>
+              <a:rPr lang="en-US" baseline="0" dirty="0" smtClean="0"/>
+              <a:t>Naïve:  do all-to-all comparison</a:t>
+            </a:r>
+          </a:p>
+          <a:p>
+            <a:r>
+              <a:rPr lang="en-US" baseline="0" dirty="0" smtClean="0"/>
+              <a:t>However, we do partitioning</a:t>
+            </a:r>
+          </a:p>
+          <a:p>
+            <a:r>
+              <a:rPr lang="en-US" baseline="0" dirty="0" smtClean="0"/>
+              <a:t>To make it more efficient, we use an index</a:t>
+            </a:r>
+          </a:p>
+          <a:p>
+            <a:endParaRPr lang="en-US" baseline="0" dirty="0" smtClean="0"/>
+          </a:p>
+          <a:p>
+            <a:r>
+              <a:rPr lang="en-US" baseline="0" dirty="0" smtClean="0"/>
+              <a:t>MZ suggests picture to show how indexing works</a:t>
+            </a:r>
           </a:p>
         </p:txBody>
       </p:sp>
@@ -3390,10 +3546,10 @@
           <a:bodyPr/>
           <a:lstStyle/>
           <a:p>
-            <a:fld id="{56D28874-1678-3448-827B-018601F8A9DB}" type="slidenum">
+            <a:fld id="{D595E2EF-4AF3-F948-88CD-8E02C76C0292}" type="slidenum">
               <a:rPr lang="en-US" smtClean="0"/>
               <a:pPr/>
-              <a:t>26</a:t>
+              <a:t>17</a:t>
             </a:fld>
             <a:endParaRPr lang="en-US"/>
           </a:p>
@@ -3455,7 +3611,46 @@
           <a:p>
             <a:r>
               <a:rPr lang="en-US" dirty="0" smtClean="0"/>
-              <a:t>TODO:  could add a picture here</a:t>
+              <a:t>TS:  mention size of chr22</a:t>
+            </a:r>
+          </a:p>
+          <a:p>
+            <a:r>
+              <a:rPr lang="en-US" dirty="0" smtClean="0"/>
+              <a:t>MZ:</a:t>
+            </a:r>
+            <a:r>
+              <a:rPr lang="en-US" baseline="0" dirty="0" smtClean="0"/>
+              <a:t>  mention that time is </a:t>
+            </a:r>
+            <a:r>
+              <a:rPr lang="en-US" baseline="0" dirty="0" err="1" smtClean="0"/>
+              <a:t>superlinear</a:t>
+            </a:r>
+            <a:endParaRPr lang="en-US" baseline="0" dirty="0" smtClean="0"/>
+          </a:p>
+          <a:p>
+            <a:endParaRPr lang="en-US" baseline="0" dirty="0" smtClean="0"/>
+          </a:p>
+          <a:p>
+            <a:r>
+              <a:rPr lang="en-US" baseline="0" dirty="0" smtClean="0"/>
+              <a:t>MZ:  this is one of the big challenges, and we solved it</a:t>
+            </a:r>
+          </a:p>
+          <a:p>
+            <a:r>
+              <a:rPr lang="en-US" baseline="0" dirty="0" smtClean="0"/>
+              <a:t>Could make this 2 slides</a:t>
+            </a:r>
+          </a:p>
+          <a:p>
+            <a:endParaRPr lang="en-US" baseline="0" dirty="0" smtClean="0"/>
+          </a:p>
+          <a:p>
+            <a:r>
+              <a:rPr lang="en-US" baseline="0" dirty="0" smtClean="0"/>
+              <a:t>JT/BT:  either leave out the details, or talk about it</a:t>
             </a:r>
             <a:endParaRPr lang="en-US" dirty="0"/>
           </a:p>
@@ -3479,7 +3674,7 @@
             <a:fld id="{56D28874-1678-3448-827B-018601F8A9DB}" type="slidenum">
               <a:rPr lang="en-US" smtClean="0"/>
               <a:pPr/>
-              <a:t>27</a:t>
+              <a:t>18</a:t>
             </a:fld>
             <a:endParaRPr lang="en-US"/>
           </a:p>
@@ -3541,7 +3736,15 @@
           <a:p>
             <a:r>
               <a:rPr lang="en-US" dirty="0" smtClean="0"/>
-              <a:t>TODO:  draw picture based on Hamming distance version</a:t>
+              <a:t>TODO:</a:t>
+            </a:r>
+            <a:r>
+              <a:rPr lang="en-US" baseline="0" dirty="0" smtClean="0"/>
+              <a:t>  add #</a:t>
+            </a:r>
+            <a:r>
+              <a:rPr lang="en-US" baseline="0" dirty="0" err="1" smtClean="0"/>
+              <a:t>s</a:t>
             </a:r>
             <a:endParaRPr lang="en-US" dirty="0"/>
           </a:p>
@@ -3565,7 +3768,7 @@
             <a:fld id="{56D28874-1678-3448-827B-018601F8A9DB}" type="slidenum">
               <a:rPr lang="en-US" smtClean="0"/>
               <a:pPr/>
-              <a:t>29</a:t>
+              <a:t>19</a:t>
             </a:fld>
             <a:endParaRPr lang="en-US"/>
           </a:p>
@@ -3627,11 +3830,68 @@
           <a:p>
             <a:r>
               <a:rPr lang="en-US" dirty="0" smtClean="0"/>
-              <a:t>Basically</a:t>
+              <a:t>Height of first bar:  39,990,220</a:t>
+            </a:r>
+          </a:p>
+          <a:p>
+            <a:r>
+              <a:rPr lang="en-US" dirty="0" smtClean="0"/>
+              <a:t>Height of second bar:  </a:t>
+            </a:r>
+            <a:r>
+              <a:rPr lang="en-US" dirty="0" smtClean="0"/>
+              <a:t>1672</a:t>
+            </a:r>
+          </a:p>
+          <a:p>
+            <a:endParaRPr lang="en-US" dirty="0" smtClean="0"/>
+          </a:p>
+          <a:p>
+            <a:r>
+              <a:rPr lang="en-US" dirty="0" smtClean="0"/>
+              <a:t>BT: </a:t>
             </a:r>
             <a:r>
               <a:rPr lang="en-US" baseline="0" dirty="0" smtClean="0"/>
-              <a:t> say that right now, we’re slower than the regular SNAP, but the error rate is much better.  We do have a reduction in % aligned, because we end up considering more locations so we can identify that sometimes a read is ambiguous.  So, how to fix?  We’re working on making it faster.</a:t>
+              <a:t> build</a:t>
+            </a:r>
+          </a:p>
+          <a:p>
+            <a:r>
+              <a:rPr lang="en-US" baseline="0" dirty="0" smtClean="0"/>
+              <a:t>RX:  make graph not looked chopped</a:t>
+            </a:r>
+          </a:p>
+          <a:p>
+            <a:endParaRPr lang="en-US" baseline="0" dirty="0" smtClean="0"/>
+          </a:p>
+          <a:p>
+            <a:r>
+              <a:rPr lang="en-US" baseline="0" dirty="0" smtClean="0"/>
+              <a:t>TS, SS:  this graph is interesting</a:t>
+            </a:r>
+          </a:p>
+          <a:p>
+            <a:r>
+              <a:rPr lang="en-US" baseline="0" dirty="0" smtClean="0"/>
+              <a:t>MZ:  add a graph showing # locations by cluster size (CDF)</a:t>
+            </a:r>
+          </a:p>
+          <a:p>
+            <a:endParaRPr lang="en-US" baseline="0" dirty="0" smtClean="0"/>
+          </a:p>
+          <a:p>
+            <a:r>
+              <a:rPr lang="en-US" baseline="0" dirty="0" smtClean="0"/>
+              <a:t>MZ:  look at what those positions are (</a:t>
+            </a:r>
+            <a:r>
+              <a:rPr lang="en-US" baseline="0" dirty="0" err="1" smtClean="0"/>
+              <a:t>eg</a:t>
+            </a:r>
+            <a:r>
+              <a:rPr lang="en-US" baseline="0" dirty="0" smtClean="0"/>
+              <a:t>, in genome browser)</a:t>
             </a:r>
             <a:endParaRPr lang="en-US" dirty="0"/>
           </a:p>
@@ -3655,7 +3915,7 @@
             <a:fld id="{56D28874-1678-3448-827B-018601F8A9DB}" type="slidenum">
               <a:rPr lang="en-US" smtClean="0"/>
               <a:pPr/>
-              <a:t>30</a:t>
+              <a:t>20</a:t>
             </a:fld>
             <a:endParaRPr lang="en-US"/>
           </a:p>
@@ -3717,33 +3977,23 @@
           <a:p>
             <a:r>
               <a:rPr lang="en-US" dirty="0" smtClean="0"/>
-              <a:t>Compare </a:t>
-            </a:r>
+              <a:t>Three arrows make this confusing</a:t>
+            </a:r>
+          </a:p>
+          <a:p>
             <a:r>
               <a:rPr lang="en-US" dirty="0" smtClean="0"/>
-              <a:t>to </a:t>
+              <a:t>Make it more obvious that the three </a:t>
             </a:r>
             <a:r>
               <a:rPr lang="en-US" dirty="0" err="1" smtClean="0"/>
-              <a:t>mr</a:t>
+              <a:t>pics</a:t>
             </a:r>
             <a:r>
               <a:rPr lang="en-US" dirty="0" smtClean="0"/>
-              <a:t> fast, </a:t>
-            </a:r>
-            <a:r>
-              <a:rPr lang="en-US" dirty="0" err="1" smtClean="0"/>
-              <a:t>mrs</a:t>
-            </a:r>
-            <a:r>
-              <a:rPr lang="en-US" dirty="0" smtClean="0"/>
-              <a:t> fast (others?</a:t>
-            </a:r>
-            <a:r>
-              <a:rPr lang="en-US" dirty="0" smtClean="0"/>
-              <a:t>)</a:t>
-            </a:r>
-            <a:endParaRPr lang="en-US" dirty="0" smtClean="0"/>
+              <a:t> on side are different (like maybe bold)</a:t>
+            </a:r>
+            <a:endParaRPr lang="en-US" dirty="0"/>
           </a:p>
         </p:txBody>
       </p:sp>
@@ -3765,7 +4015,7 @@
             <a:fld id="{56D28874-1678-3448-827B-018601F8A9DB}" type="slidenum">
               <a:rPr lang="en-US" smtClean="0"/>
               <a:pPr/>
-              <a:t>31</a:t>
+              <a:t>22</a:t>
             </a:fld>
             <a:endParaRPr lang="en-US"/>
           </a:p>
@@ -3831,7 +4081,20 @@
             </a:r>
             <a:r>
               <a:rPr lang="en-US" baseline="0" dirty="0" smtClean="0"/>
-              <a:t> interesting big data problem that requires lots of computer science innovation, since not only is there a ton of this data beginning to accumulate, but also it’s hard to work with even one patient’s sample</a:t>
+              <a:t> interesting big data problem that requires lots of computer science innovation, since not only is there a ton of this data beginning to accumulate, but also it’s hard to work with even one patient’s </a:t>
+            </a:r>
+            <a:r>
+              <a:rPr lang="en-US" baseline="0" dirty="0" smtClean="0"/>
+              <a:t>sample</a:t>
+            </a:r>
+          </a:p>
+          <a:p>
+            <a:endParaRPr lang="en-US" baseline="0" dirty="0" smtClean="0"/>
+          </a:p>
+          <a:p>
+            <a:r>
+              <a:rPr lang="en-US" baseline="0" dirty="0" smtClean="0"/>
+              <a:t>MS:  data processing already dominates cost (has reviews)</a:t>
             </a:r>
             <a:endParaRPr lang="en-US" dirty="0"/>
           </a:p>
@@ -3915,40 +4178,6 @@
           </a:bodyPr>
           <a:lstStyle/>
           <a:p>
-            <a:r>
-              <a:rPr lang="en-US" dirty="0" smtClean="0"/>
-              <a:t>TODO:  talk about insights from</a:t>
-            </a:r>
-            <a:r>
-              <a:rPr lang="en-US" baseline="0" dirty="0" smtClean="0"/>
-              <a:t> profiling &amp; plans to improve speed</a:t>
-            </a:r>
-          </a:p>
-          <a:p>
-            <a:r>
-              <a:rPr lang="en-US" baseline="0" dirty="0" smtClean="0"/>
-              <a:t>Add more here!</a:t>
-            </a:r>
-          </a:p>
-          <a:p>
-            <a:r>
-              <a:rPr lang="en-US" baseline="0" dirty="0" smtClean="0"/>
-              <a:t>Might have to distinguish this from the current index – difference is that the current index gives you a position for the cluster id, but it doesn’t tell you whether that pos is in a cluster</a:t>
-            </a:r>
-          </a:p>
-          <a:p>
-            <a:r>
-              <a:rPr lang="en-US" baseline="0" dirty="0" smtClean="0"/>
-              <a:t>Can you modify </a:t>
-            </a:r>
-            <a:r>
-              <a:rPr lang="en-US" baseline="0" dirty="0" err="1" smtClean="0"/>
-              <a:t>getClusterInfo</a:t>
-            </a:r>
-            <a:r>
-              <a:rPr lang="en-US" baseline="0" dirty="0" smtClean="0"/>
-              <a:t> to only have cluster IDs rather than pos?  Like, rather than “is this in a cluster”, it would be “is this a cluster id” – might fit in cache</a:t>
-            </a:r>
             <a:endParaRPr lang="en-US" dirty="0"/>
           </a:p>
         </p:txBody>
@@ -3968,10 +4197,10 @@
           <a:bodyPr/>
           <a:lstStyle/>
           <a:p>
-            <a:fld id="{56D28874-1678-3448-827B-018601F8A9DB}" type="slidenum">
+            <a:fld id="{D595E2EF-4AF3-F948-88CD-8E02C76C0292}" type="slidenum">
               <a:rPr lang="en-US" smtClean="0"/>
               <a:pPr/>
-              <a:t>32</a:t>
+              <a:t>23</a:t>
             </a:fld>
             <a:endParaRPr lang="en-US"/>
           </a:p>
@@ -4031,6 +4260,18 @@
           </a:bodyPr>
           <a:lstStyle/>
           <a:p>
+            <a:r>
+              <a:rPr lang="en-US" dirty="0" smtClean="0"/>
+              <a:t>BT:  bring </a:t>
+            </a:r>
+            <a:r>
+              <a:rPr lang="en-US" dirty="0" err="1" smtClean="0"/>
+              <a:t>pic</a:t>
+            </a:r>
+            <a:r>
+              <a:rPr lang="en-US" baseline="0" dirty="0" smtClean="0"/>
+              <a:t> here</a:t>
+            </a:r>
             <a:endParaRPr lang="en-US" dirty="0"/>
           </a:p>
         </p:txBody>
@@ -4053,7 +4294,7 @@
             <a:fld id="{56D28874-1678-3448-827B-018601F8A9DB}" type="slidenum">
               <a:rPr lang="en-US" smtClean="0"/>
               <a:pPr/>
-              <a:t>34</a:t>
+              <a:t>25</a:t>
             </a:fld>
             <a:endParaRPr lang="en-US"/>
           </a:p>
@@ -4115,12 +4356,9 @@
           <a:p>
             <a:r>
               <a:rPr lang="en-US" dirty="0" smtClean="0"/>
-              <a:t>Not</a:t>
-            </a:r>
-            <a:r>
-              <a:rPr lang="en-US" baseline="0" dirty="0" smtClean="0"/>
-              <a:t> tied to SNAP</a:t>
-            </a:r>
+              <a:t>TODO:  flesh these out</a:t>
+            </a:r>
+            <a:endParaRPr lang="en-US" dirty="0"/>
           </a:p>
         </p:txBody>
       </p:sp>
@@ -4142,7 +4380,7 @@
             <a:fld id="{56D28874-1678-3448-827B-018601F8A9DB}" type="slidenum">
               <a:rPr lang="en-US" smtClean="0"/>
               <a:pPr/>
-              <a:t>36</a:t>
+              <a:t>26</a:t>
             </a:fld>
             <a:endParaRPr lang="en-US"/>
           </a:p>
@@ -4204,15 +4442,7 @@
           <a:p>
             <a:r>
               <a:rPr lang="en-US" dirty="0" smtClean="0"/>
-              <a:t>TODO:  get #</a:t>
-            </a:r>
-            <a:r>
-              <a:rPr lang="en-US" dirty="0" err="1" smtClean="0"/>
-              <a:t>s</a:t>
-            </a:r>
-            <a:r>
-              <a:rPr lang="en-US" dirty="0" smtClean="0"/>
-              <a:t> for experiment</a:t>
+              <a:t>TODO:  could add a picture here</a:t>
             </a:r>
             <a:endParaRPr lang="en-US" dirty="0"/>
           </a:p>
@@ -4236,7 +4466,7 @@
             <a:fld id="{56D28874-1678-3448-827B-018601F8A9DB}" type="slidenum">
               <a:rPr lang="en-US" smtClean="0"/>
               <a:pPr/>
-              <a:t>37</a:t>
+              <a:t>27</a:t>
             </a:fld>
             <a:endParaRPr lang="en-US"/>
           </a:p>
@@ -4298,7 +4528,15 @@
           <a:p>
             <a:r>
               <a:rPr lang="en-US" dirty="0" smtClean="0"/>
-              <a:t>Dates for submission to journal (month granularity); also specific journal</a:t>
+              <a:t>MZ:</a:t>
+            </a:r>
+            <a:r>
+              <a:rPr lang="en-US" baseline="0" dirty="0" smtClean="0"/>
+              <a:t>  </a:t>
+            </a:r>
+            <a:r>
+              <a:rPr lang="en-US" dirty="0" smtClean="0"/>
+              <a:t>Picture here</a:t>
             </a:r>
             <a:endParaRPr lang="en-US" dirty="0"/>
           </a:p>
@@ -4322,7 +4560,7 @@
             <a:fld id="{56D28874-1678-3448-827B-018601F8A9DB}" type="slidenum">
               <a:rPr lang="en-US" smtClean="0"/>
               <a:pPr/>
-              <a:t>39</a:t>
+              <a:t>28</a:t>
             </a:fld>
             <a:endParaRPr lang="en-US"/>
           </a:p>
@@ -4384,19 +4622,7 @@
           <a:p>
             <a:r>
               <a:rPr lang="en-US" dirty="0" smtClean="0"/>
-              <a:t>TODO:  add Blast,</a:t>
-            </a:r>
-            <a:r>
-              <a:rPr lang="en-US" baseline="0" dirty="0" smtClean="0"/>
-              <a:t> </a:t>
-            </a:r>
-            <a:r>
-              <a:rPr lang="en-US" baseline="0" dirty="0" err="1" smtClean="0"/>
-              <a:t>Ukkonen</a:t>
-            </a:r>
-            <a:r>
-              <a:rPr lang="en-US" baseline="0" dirty="0" smtClean="0"/>
-              <a:t>, Smith-Waterman</a:t>
+              <a:t>TODO:  draw picture based on Hamming distance version</a:t>
             </a:r>
             <a:endParaRPr lang="en-US" dirty="0"/>
           </a:p>
@@ -4420,7 +4646,7 @@
             <a:fld id="{56D28874-1678-3448-827B-018601F8A9DB}" type="slidenum">
               <a:rPr lang="en-US" smtClean="0"/>
               <a:pPr/>
-              <a:t>41</a:t>
+              <a:t>29</a:t>
             </a:fld>
             <a:endParaRPr lang="en-US"/>
           </a:p>
@@ -4482,76 +4708,71 @@
           <a:p>
             <a:r>
               <a:rPr lang="en-US" dirty="0" smtClean="0"/>
-              <a:t>Segue:  let’s talk more about what’s involved in the data processing</a:t>
-            </a:r>
-          </a:p>
-          <a:p>
-            <a:r>
-              <a:rPr lang="en-US" dirty="0" smtClean="0"/>
-              <a:t>You have a bunch of reads, want to put them together (puzzle analogy)</a:t>
-            </a:r>
-          </a:p>
-          <a:p>
-            <a:r>
-              <a:rPr lang="en-US" dirty="0" smtClean="0"/>
-              <a:t>You</a:t>
+              <a:t>Basically</a:t>
             </a:r>
             <a:r>
               <a:rPr lang="en-US" baseline="0" dirty="0" smtClean="0"/>
-              <a:t> use a reference genome (like the picture on the puzzle box)</a:t>
-            </a:r>
-            <a:endParaRPr lang="en-US" dirty="0" smtClean="0"/>
-          </a:p>
-          <a:p>
-            <a:r>
-              <a:rPr lang="en-US" dirty="0" smtClean="0"/>
-              <a:t>Variants appear in reads</a:t>
-            </a:r>
-          </a:p>
-          <a:p>
-            <a:r>
-              <a:rPr lang="en-US" dirty="0" smtClean="0"/>
-              <a:t>Align reads</a:t>
-            </a:r>
-          </a:p>
-          <a:p>
-            <a:r>
-              <a:rPr lang="en-US" dirty="0" smtClean="0"/>
-              <a:t>For a particular position, jointly consider reads aligned there</a:t>
-            </a:r>
-          </a:p>
-          <a:p>
-            <a:r>
-              <a:rPr lang="en-US" dirty="0" smtClean="0"/>
-              <a:t>Consensus =&gt; call a variant</a:t>
-            </a:r>
-          </a:p>
-          <a:p>
-            <a:r>
-              <a:rPr lang="en-US" dirty="0" smtClean="0"/>
-              <a:t>Do this for all positions =&gt; reconstructed genome</a:t>
-            </a:r>
-          </a:p>
-          <a:p>
-            <a:r>
-              <a:rPr lang="en-US" dirty="0" smtClean="0"/>
-              <a:t>Remove 0.1%</a:t>
+              <a:t> say that right now, we’re slower than the regular SNAP, but the error rate is much better.  We do have a reduction in % aligned, because we end up considering more locations so we can identify that sometimes a read is ambiguous.  So, how to fix?  We’re working on making it faster</a:t>
             </a:r>
             <a:r>
               <a:rPr lang="en-US" baseline="0" dirty="0" smtClean="0"/>
-              <a:t> figure since it’s just for </a:t>
+              <a:t>.</a:t>
+            </a:r>
+          </a:p>
+          <a:p>
+            <a:endParaRPr lang="en-US" baseline="0" dirty="0" smtClean="0"/>
+          </a:p>
+          <a:p>
+            <a:r>
+              <a:rPr lang="en-US" baseline="0" dirty="0" smtClean="0"/>
+              <a:t>TS:  best-matcher, all-matcher, multi-matcher too confusing</a:t>
+            </a:r>
+          </a:p>
+          <a:p>
+            <a:endParaRPr lang="en-US" baseline="0" dirty="0" smtClean="0"/>
+          </a:p>
+          <a:p>
+            <a:r>
+              <a:rPr lang="en-US" baseline="0" dirty="0" smtClean="0"/>
+              <a:t>BT:  look at one graph at a time</a:t>
+            </a:r>
+          </a:p>
+          <a:p>
+            <a:r>
+              <a:rPr lang="en-US" baseline="0" dirty="0" smtClean="0"/>
+              <a:t>Look at one dataset at a time</a:t>
+            </a:r>
+          </a:p>
+          <a:p>
+            <a:r>
+              <a:rPr lang="en-US" baseline="0" dirty="0" smtClean="0"/>
+              <a:t>JT:  Add “better” arrows</a:t>
+            </a:r>
+          </a:p>
+          <a:p>
+            <a:endParaRPr lang="en-US" baseline="0" dirty="0" smtClean="0"/>
+          </a:p>
+          <a:p>
+            <a:r>
+              <a:rPr lang="en-US" baseline="0" dirty="0" smtClean="0"/>
+              <a:t>JT:  confusing that good is down on left, but good is up on right</a:t>
+            </a:r>
+          </a:p>
+          <a:p>
+            <a:endParaRPr lang="en-US" baseline="0" dirty="0" smtClean="0"/>
+          </a:p>
+          <a:p>
+            <a:r>
+              <a:rPr lang="en-US" baseline="0" dirty="0" smtClean="0"/>
+              <a:t>RX:  didn’t see BWA, </a:t>
             </a:r>
             <a:r>
               <a:rPr lang="en-US" baseline="0" dirty="0" err="1" smtClean="0"/>
-              <a:t>SNPs</a:t>
+              <a:t>Novoalign</a:t>
             </a:r>
             <a:r>
               <a:rPr lang="en-US" baseline="0" dirty="0" smtClean="0"/>
-              <a:t>/small </a:t>
-            </a:r>
-            <a:r>
-              <a:rPr lang="en-US" baseline="0" dirty="0" err="1" smtClean="0"/>
-              <a:t>indels</a:t>
+              <a:t> points</a:t>
             </a:r>
             <a:endParaRPr lang="en-US" dirty="0"/>
           </a:p>
@@ -4572,10 +4793,10 @@
           <a:bodyPr/>
           <a:lstStyle/>
           <a:p>
-            <a:fld id="{69091A11-F846-B944-867A-2BC3F162A9B3}" type="slidenum">
+            <a:fld id="{56D28874-1678-3448-827B-018601F8A9DB}" type="slidenum">
               <a:rPr lang="en-US" smtClean="0"/>
               <a:pPr/>
-              <a:t>44</a:t>
+              <a:t>30</a:t>
             </a:fld>
             <a:endParaRPr lang="en-US"/>
           </a:p>
@@ -4637,25 +4858,60 @@
           <a:p>
             <a:r>
               <a:rPr lang="en-US" dirty="0" smtClean="0"/>
-              <a:t>TODO:</a:t>
+              <a:t>Compare to </a:t>
+            </a:r>
+            <a:r>
+              <a:rPr lang="en-US" dirty="0" err="1" smtClean="0"/>
+              <a:t>mr</a:t>
+            </a:r>
+            <a:r>
+              <a:rPr lang="en-US" dirty="0" smtClean="0"/>
+              <a:t> fast, </a:t>
+            </a:r>
+            <a:r>
+              <a:rPr lang="en-US" dirty="0" err="1" smtClean="0"/>
+              <a:t>mrs</a:t>
+            </a:r>
+            <a:r>
+              <a:rPr lang="en-US" dirty="0" smtClean="0"/>
+              <a:t> fast (others?</a:t>
+            </a:r>
+            <a:r>
+              <a:rPr lang="en-US" dirty="0" smtClean="0"/>
+              <a:t>)</a:t>
+            </a:r>
+          </a:p>
+          <a:p>
+            <a:endParaRPr lang="en-US" dirty="0" smtClean="0"/>
+          </a:p>
+          <a:p>
+            <a:r>
+              <a:rPr lang="en-US" dirty="0" smtClean="0"/>
+              <a:t>BT:  “algorithm” column busy</a:t>
+            </a:r>
+          </a:p>
+          <a:p>
+            <a:endParaRPr lang="en-US" dirty="0" smtClean="0"/>
+          </a:p>
+          <a:p>
+            <a:r>
+              <a:rPr lang="en-US" dirty="0" smtClean="0"/>
+              <a:t>MZ:</a:t>
             </a:r>
             <a:r>
               <a:rPr lang="en-US" baseline="0" dirty="0" smtClean="0"/>
-              <a:t>  </a:t>
-            </a:r>
-            <a:r>
-              <a:rPr lang="en-US" dirty="0" smtClean="0"/>
-              <a:t>Add reference</a:t>
-            </a:r>
+              <a:t>  drop middle row</a:t>
+            </a:r>
+          </a:p>
+          <a:p>
+            <a:endParaRPr lang="en-US" baseline="0" dirty="0" smtClean="0"/>
+          </a:p>
+          <a:p>
             <a:r>
               <a:rPr lang="en-US" baseline="0" dirty="0" smtClean="0"/>
-              <a:t> to SW, </a:t>
-            </a:r>
-            <a:r>
-              <a:rPr lang="en-US" baseline="0" dirty="0" err="1" smtClean="0"/>
-              <a:t>Ukkonen</a:t>
-            </a:r>
-            <a:endParaRPr lang="en-US" dirty="0"/>
+              <a:t>JT:  caption looks like row of table</a:t>
+            </a:r>
+            <a:endParaRPr lang="en-US" dirty="0" smtClean="0"/>
           </a:p>
         </p:txBody>
       </p:sp>
@@ -4677,7 +4933,7 @@
             <a:fld id="{56D28874-1678-3448-827B-018601F8A9DB}" type="slidenum">
               <a:rPr lang="en-US" smtClean="0"/>
               <a:pPr/>
-              <a:t>47</a:t>
+              <a:t>31</a:t>
             </a:fld>
             <a:endParaRPr lang="en-US"/>
           </a:p>
@@ -4739,25 +4995,62 @@
           <a:p>
             <a:r>
               <a:rPr lang="en-US" dirty="0" smtClean="0"/>
-              <a:t>TODO:</a:t>
+              <a:t>TODO:  talk about insights from</a:t>
             </a:r>
             <a:r>
               <a:rPr lang="en-US" baseline="0" dirty="0" smtClean="0"/>
-              <a:t>  quote some #</a:t>
+              <a:t> profiling &amp; plans to improve speed</a:t>
+            </a:r>
+          </a:p>
+          <a:p>
+            <a:r>
+              <a:rPr lang="en-US" baseline="0" dirty="0" smtClean="0"/>
+              <a:t>Add more here!</a:t>
+            </a:r>
+          </a:p>
+          <a:p>
+            <a:r>
+              <a:rPr lang="en-US" baseline="0" dirty="0" smtClean="0"/>
+              <a:t>Might have to distinguish this from the current index – difference is that the current index gives you a position for the cluster id, but it doesn’t tell you whether that pos is in a cluster</a:t>
+            </a:r>
+          </a:p>
+          <a:p>
+            <a:r>
+              <a:rPr lang="en-US" baseline="0" dirty="0" smtClean="0"/>
+              <a:t>Can you modify </a:t>
             </a:r>
             <a:r>
               <a:rPr lang="en-US" baseline="0" dirty="0" err="1" smtClean="0"/>
-              <a:t>s</a:t>
+              <a:t>getClusterInfo</a:t>
             </a:r>
             <a:r>
               <a:rPr lang="en-US" baseline="0" dirty="0" smtClean="0"/>
-              <a:t> for runtime of these algorithms</a:t>
-            </a:r>
-          </a:p>
-          <a:p>
+              <a:t> to only have cluster IDs rather than pos?  Like, rather than “is this in a cluster”, it would be “is this a cluster id” – might fit in </a:t>
+            </a:r>
             <a:r>
               <a:rPr lang="en-US" baseline="0" dirty="0" smtClean="0"/>
-              <a:t>TODO:  add some newer citations</a:t>
+              <a:t>cache</a:t>
+            </a:r>
+          </a:p>
+          <a:p>
+            <a:endParaRPr lang="en-US" baseline="0" dirty="0" smtClean="0"/>
+          </a:p>
+          <a:p>
+            <a:r>
+              <a:rPr lang="en-US" baseline="0" dirty="0" smtClean="0"/>
+              <a:t>MZ:  could show profiling results</a:t>
+            </a:r>
+          </a:p>
+          <a:p>
+            <a:r>
+              <a:rPr lang="en-US" baseline="0" dirty="0" smtClean="0"/>
+              <a:t>BT:  don’t say “we” on slide</a:t>
+            </a:r>
+          </a:p>
+          <a:p>
+            <a:r>
+              <a:rPr lang="en-US" baseline="0" dirty="0" smtClean="0"/>
+              <a:t>JT:  just trim beginning of sentence</a:t>
             </a:r>
             <a:endParaRPr lang="en-US" dirty="0"/>
           </a:p>
@@ -4781,7 +5074,7 @@
             <a:fld id="{56D28874-1678-3448-827B-018601F8A9DB}" type="slidenum">
               <a:rPr lang="en-US" smtClean="0"/>
               <a:pPr/>
-              <a:t>48</a:t>
+              <a:t>32</a:t>
             </a:fld>
             <a:endParaRPr lang="en-US"/>
           </a:p>
@@ -4843,48 +5136,52 @@
           <a:p>
             <a:r>
               <a:rPr lang="en-US" dirty="0" smtClean="0"/>
-              <a:t>TODO: </a:t>
+              <a:t>MZ:  shorten filtering part</a:t>
+            </a:r>
+          </a:p>
+          <a:p>
+            <a:pPr marL="228600" indent="-228600">
+              <a:buAutoNum type="arabicParenBoth"/>
+            </a:pPr>
+            <a:r>
+              <a:rPr lang="en-US" dirty="0" smtClean="0"/>
+              <a:t>Genomes in db may have a lot of similarity =&gt; much</a:t>
             </a:r>
             <a:r>
               <a:rPr lang="en-US" baseline="0" dirty="0" smtClean="0"/>
-              <a:t> add real #</a:t>
-            </a:r>
-            <a:r>
-              <a:rPr lang="en-US" baseline="0" dirty="0" err="1" smtClean="0"/>
-              <a:t>s</a:t>
+              <a:t> higher fraction in clusters</a:t>
+            </a:r>
+            <a:endParaRPr lang="en-US" dirty="0" smtClean="0"/>
+          </a:p>
+          <a:p>
+            <a:pPr marL="228600" indent="-228600">
+              <a:buAutoNum type="arabicParenBoth"/>
+            </a:pPr>
+            <a:r>
+              <a:rPr lang="en-US" dirty="0" smtClean="0"/>
+              <a:t>You just need any match (not best match) =&gt; Just comparing against consensus lets you</a:t>
             </a:r>
             <a:r>
               <a:rPr lang="en-US" baseline="0" dirty="0" smtClean="0"/>
-              <a:t> for </a:t>
-            </a:r>
-            <a:r>
-              <a:rPr lang="en-US" baseline="0" dirty="0" err="1" smtClean="0"/>
-              <a:t>sim</a:t>
-            </a:r>
+              <a:t> know if it’s close enough</a:t>
+            </a:r>
+          </a:p>
+          <a:p>
+            <a:pPr marL="228600" indent="-228600">
+              <a:buNone/>
+            </a:pPr>
             <a:r>
               <a:rPr lang="en-US" baseline="0" dirty="0" smtClean="0"/>
-              <a:t>-aware SNAP</a:t>
-            </a:r>
-          </a:p>
-          <a:p>
+              <a:t>Less detail (just give one application)</a:t>
+            </a:r>
+          </a:p>
+          <a:p>
+            <a:pPr marL="228600" indent="-228600">
+              <a:buNone/>
+            </a:pPr>
             <a:r>
               <a:rPr lang="en-US" baseline="0" dirty="0" smtClean="0"/>
-              <a:t>Aligning 1e6 simulated reads to the whole genome, single end, best matcher</a:t>
-            </a:r>
-          </a:p>
-          <a:p>
-            <a:r>
-              <a:rPr lang="en-US" baseline="0" dirty="0" smtClean="0"/>
-              <a:t>Used cc2.8xlarge</a:t>
-            </a:r>
-          </a:p>
-          <a:p>
-            <a:endParaRPr lang="en-US" baseline="0" dirty="0" smtClean="0"/>
-          </a:p>
-          <a:p>
-            <a:r>
-              <a:rPr lang="en-US" baseline="0" dirty="0" smtClean="0"/>
-              <a:t>** may change this to be from c95</a:t>
+              <a:t>For removing contamination:  looking against db of many similar bacterial sequences</a:t>
             </a:r>
             <a:endParaRPr lang="en-US" dirty="0"/>
           </a:p>
@@ -4908,7 +5205,7 @@
             <a:fld id="{56D28874-1678-3448-827B-018601F8A9DB}" type="slidenum">
               <a:rPr lang="en-US" smtClean="0"/>
               <a:pPr/>
-              <a:t>50</a:t>
+              <a:t>34</a:t>
             </a:fld>
             <a:endParaRPr lang="en-US"/>
           </a:p>
@@ -4968,6 +5265,32 @@
           </a:bodyPr>
           <a:lstStyle/>
           <a:p>
+            <a:r>
+              <a:rPr lang="en-US" dirty="0" smtClean="0"/>
+              <a:t>TS:  variant calling has to be accurate</a:t>
+            </a:r>
+          </a:p>
+          <a:p>
+            <a:r>
+              <a:rPr lang="en-US" dirty="0" smtClean="0"/>
+              <a:t>MZ:  emphasize accuracy</a:t>
+            </a:r>
+          </a:p>
+          <a:p>
+            <a:r>
+              <a:rPr lang="en-US" dirty="0" smtClean="0"/>
+              <a:t>MS:</a:t>
+            </a:r>
+            <a:r>
+              <a:rPr lang="en-US" baseline="0" dirty="0" smtClean="0"/>
+              <a:t>  show how you could miss a SNP</a:t>
+            </a:r>
+          </a:p>
+          <a:p>
+            <a:r>
+              <a:rPr lang="en-US" baseline="0" dirty="0" smtClean="0"/>
+              <a:t>AF:  show that clusters are going into “proposed pipeline”</a:t>
+            </a:r>
             <a:endParaRPr lang="en-US" dirty="0"/>
           </a:p>
         </p:txBody>
@@ -4991,6 +5314,976 @@
               <a:rPr lang="en-US" smtClean="0"/>
               <a:pPr/>
               <a:t>3</a:t>
+            </a:fld>
+            <a:endParaRPr lang="en-US"/>
+          </a:p>
+        </p:txBody>
+      </p:sp>
+    </p:spTree>
+  </p:cSld>
+  <p:clrMapOvr>
+    <a:masterClrMapping/>
+  </p:clrMapOvr>
+</p:notes>
+</file>
+
+<file path=ppt/notesSlides/notesSlide30.xml><?xml version="1.0" encoding="utf-8"?>
+<p:notes xmlns:a="http://schemas.openxmlformats.org/drawingml/2006/main" xmlns:r="http://schemas.openxmlformats.org/officeDocument/2006/relationships" xmlns:mc="http://schemas.openxmlformats.org/markup-compatibility/2006" xmlns:mv="urn:schemas-microsoft-com:mac:vml" xmlns:p="http://schemas.openxmlformats.org/presentationml/2006/main" mc:Ignorable="mv" mc:PreserveAttributes="mv:*">
+  <p:cSld>
+    <p:spTree>
+      <p:nvGrpSpPr>
+        <p:cNvPr id="1" name=""/>
+        <p:cNvGrpSpPr/>
+        <p:nvPr/>
+      </p:nvGrpSpPr>
+      <p:grpSpPr>
+        <a:xfrm>
+          <a:off x="0" y="0"/>
+          <a:ext cx="0" cy="0"/>
+          <a:chOff x="0" y="0"/>
+          <a:chExt cx="0" cy="0"/>
+        </a:xfrm>
+      </p:grpSpPr>
+      <p:sp>
+        <p:nvSpPr>
+          <p:cNvPr id="2" name="Slide Image Placeholder 1"/>
+          <p:cNvSpPr>
+            <a:spLocks noGrp="1" noRot="1" noChangeAspect="1"/>
+          </p:cNvSpPr>
+          <p:nvPr>
+            <p:ph type="sldImg"/>
+          </p:nvPr>
+        </p:nvSpPr>
+        <p:spPr/>
+      </p:sp>
+      <p:sp>
+        <p:nvSpPr>
+          <p:cNvPr id="3" name="Notes Placeholder 2"/>
+          <p:cNvSpPr>
+            <a:spLocks noGrp="1"/>
+          </p:cNvSpPr>
+          <p:nvPr>
+            <p:ph type="body" idx="1"/>
+          </p:nvPr>
+        </p:nvSpPr>
+        <p:spPr/>
+        <p:txBody>
+          <a:bodyPr>
+            <a:normAutofit/>
+          </a:bodyPr>
+          <a:lstStyle/>
+          <a:p>
+            <a:r>
+              <a:rPr lang="en-US" dirty="0" smtClean="0"/>
+              <a:t>BT:  downplaying interesting thing that I’ll be doing</a:t>
+            </a:r>
+          </a:p>
+          <a:p>
+            <a:endParaRPr lang="en-US" baseline="0" dirty="0" smtClean="0"/>
+          </a:p>
+        </p:txBody>
+      </p:sp>
+      <p:sp>
+        <p:nvSpPr>
+          <p:cNvPr id="4" name="Slide Number Placeholder 3"/>
+          <p:cNvSpPr>
+            <a:spLocks noGrp="1"/>
+          </p:cNvSpPr>
+          <p:nvPr>
+            <p:ph type="sldNum" sz="quarter" idx="10"/>
+          </p:nvPr>
+        </p:nvSpPr>
+        <p:spPr/>
+        <p:txBody>
+          <a:bodyPr/>
+          <a:lstStyle/>
+          <a:p>
+            <a:fld id="{56D28874-1678-3448-827B-018601F8A9DB}" type="slidenum">
+              <a:rPr lang="en-US" smtClean="0"/>
+              <a:pPr/>
+              <a:t>36</a:t>
+            </a:fld>
+            <a:endParaRPr lang="en-US"/>
+          </a:p>
+        </p:txBody>
+      </p:sp>
+    </p:spTree>
+  </p:cSld>
+  <p:clrMapOvr>
+    <a:masterClrMapping/>
+  </p:clrMapOvr>
+</p:notes>
+</file>
+
+<file path=ppt/notesSlides/notesSlide31.xml><?xml version="1.0" encoding="utf-8"?>
+<p:notes xmlns:a="http://schemas.openxmlformats.org/drawingml/2006/main" xmlns:r="http://schemas.openxmlformats.org/officeDocument/2006/relationships" xmlns:mc="http://schemas.openxmlformats.org/markup-compatibility/2006" xmlns:mv="urn:schemas-microsoft-com:mac:vml" xmlns:p="http://schemas.openxmlformats.org/presentationml/2006/main" mc:Ignorable="mv" mc:PreserveAttributes="mv:*">
+  <p:cSld>
+    <p:spTree>
+      <p:nvGrpSpPr>
+        <p:cNvPr id="1" name=""/>
+        <p:cNvGrpSpPr/>
+        <p:nvPr/>
+      </p:nvGrpSpPr>
+      <p:grpSpPr>
+        <a:xfrm>
+          <a:off x="0" y="0"/>
+          <a:ext cx="0" cy="0"/>
+          <a:chOff x="0" y="0"/>
+          <a:chExt cx="0" cy="0"/>
+        </a:xfrm>
+      </p:grpSpPr>
+      <p:sp>
+        <p:nvSpPr>
+          <p:cNvPr id="2" name="Slide Image Placeholder 1"/>
+          <p:cNvSpPr>
+            <a:spLocks noGrp="1" noRot="1" noChangeAspect="1"/>
+          </p:cNvSpPr>
+          <p:nvPr>
+            <p:ph type="sldImg"/>
+          </p:nvPr>
+        </p:nvSpPr>
+        <p:spPr/>
+      </p:sp>
+      <p:sp>
+        <p:nvSpPr>
+          <p:cNvPr id="3" name="Notes Placeholder 2"/>
+          <p:cNvSpPr>
+            <a:spLocks noGrp="1"/>
+          </p:cNvSpPr>
+          <p:nvPr>
+            <p:ph type="body" idx="1"/>
+          </p:nvPr>
+        </p:nvSpPr>
+        <p:spPr/>
+        <p:txBody>
+          <a:bodyPr>
+            <a:normAutofit/>
+          </a:bodyPr>
+          <a:lstStyle/>
+          <a:p>
+            <a:r>
+              <a:rPr lang="en-US" dirty="0" smtClean="0"/>
+              <a:t>TODO:  get #</a:t>
+            </a:r>
+            <a:r>
+              <a:rPr lang="en-US" dirty="0" err="1" smtClean="0"/>
+              <a:t>s</a:t>
+            </a:r>
+            <a:r>
+              <a:rPr lang="en-US" dirty="0" smtClean="0"/>
+              <a:t> for experiment</a:t>
+            </a:r>
+            <a:endParaRPr lang="en-US" dirty="0"/>
+          </a:p>
+        </p:txBody>
+      </p:sp>
+      <p:sp>
+        <p:nvSpPr>
+          <p:cNvPr id="4" name="Slide Number Placeholder 3"/>
+          <p:cNvSpPr>
+            <a:spLocks noGrp="1"/>
+          </p:cNvSpPr>
+          <p:nvPr>
+            <p:ph type="sldNum" sz="quarter" idx="10"/>
+          </p:nvPr>
+        </p:nvSpPr>
+        <p:spPr/>
+        <p:txBody>
+          <a:bodyPr/>
+          <a:lstStyle/>
+          <a:p>
+            <a:fld id="{56D28874-1678-3448-827B-018601F8A9DB}" type="slidenum">
+              <a:rPr lang="en-US" smtClean="0"/>
+              <a:pPr/>
+              <a:t>37</a:t>
+            </a:fld>
+            <a:endParaRPr lang="en-US"/>
+          </a:p>
+        </p:txBody>
+      </p:sp>
+    </p:spTree>
+  </p:cSld>
+  <p:clrMapOvr>
+    <a:masterClrMapping/>
+  </p:clrMapOvr>
+</p:notes>
+</file>
+
+<file path=ppt/notesSlides/notesSlide32.xml><?xml version="1.0" encoding="utf-8"?>
+<p:notes xmlns:a="http://schemas.openxmlformats.org/drawingml/2006/main" xmlns:r="http://schemas.openxmlformats.org/officeDocument/2006/relationships" xmlns:mc="http://schemas.openxmlformats.org/markup-compatibility/2006" xmlns:mv="urn:schemas-microsoft-com:mac:vml" xmlns:p="http://schemas.openxmlformats.org/presentationml/2006/main" mc:Ignorable="mv" mc:PreserveAttributes="mv:*">
+  <p:cSld>
+    <p:spTree>
+      <p:nvGrpSpPr>
+        <p:cNvPr id="1" name=""/>
+        <p:cNvGrpSpPr/>
+        <p:nvPr/>
+      </p:nvGrpSpPr>
+      <p:grpSpPr>
+        <a:xfrm>
+          <a:off x="0" y="0"/>
+          <a:ext cx="0" cy="0"/>
+          <a:chOff x="0" y="0"/>
+          <a:chExt cx="0" cy="0"/>
+        </a:xfrm>
+      </p:grpSpPr>
+      <p:sp>
+        <p:nvSpPr>
+          <p:cNvPr id="2" name="Slide Image Placeholder 1"/>
+          <p:cNvSpPr>
+            <a:spLocks noGrp="1" noRot="1" noChangeAspect="1"/>
+          </p:cNvSpPr>
+          <p:nvPr>
+            <p:ph type="sldImg"/>
+          </p:nvPr>
+        </p:nvSpPr>
+        <p:spPr/>
+      </p:sp>
+      <p:sp>
+        <p:nvSpPr>
+          <p:cNvPr id="3" name="Notes Placeholder 2"/>
+          <p:cNvSpPr>
+            <a:spLocks noGrp="1"/>
+          </p:cNvSpPr>
+          <p:nvPr>
+            <p:ph type="body" idx="1"/>
+          </p:nvPr>
+        </p:nvSpPr>
+        <p:spPr/>
+        <p:txBody>
+          <a:bodyPr>
+            <a:normAutofit/>
+          </a:bodyPr>
+          <a:lstStyle/>
+          <a:p>
+            <a:r>
+              <a:rPr lang="en-US" dirty="0" smtClean="0"/>
+              <a:t>SS:  targeted assembly</a:t>
+            </a:r>
+            <a:r>
+              <a:rPr lang="en-US" baseline="0" dirty="0" smtClean="0"/>
+              <a:t> is for </a:t>
+            </a:r>
+            <a:r>
+              <a:rPr lang="en-US" baseline="0" dirty="0" err="1" smtClean="0"/>
+              <a:t>SVs</a:t>
+            </a:r>
+            <a:r>
+              <a:rPr lang="en-US" baseline="0" dirty="0" smtClean="0"/>
+              <a:t>, not </a:t>
+            </a:r>
+            <a:r>
+              <a:rPr lang="en-US" baseline="0" dirty="0" err="1" smtClean="0"/>
+              <a:t>SNPs</a:t>
+            </a:r>
+            <a:endParaRPr lang="en-US" baseline="0" dirty="0" smtClean="0"/>
+          </a:p>
+          <a:p>
+            <a:endParaRPr lang="en-US" baseline="0" dirty="0" smtClean="0"/>
+          </a:p>
+          <a:p>
+            <a:r>
+              <a:rPr lang="en-US" baseline="0" dirty="0" smtClean="0"/>
+              <a:t>MZ:  more concrete info on </a:t>
+            </a:r>
+            <a:r>
+              <a:rPr lang="en-US" baseline="0" smtClean="0"/>
+              <a:t>Biggie prototype</a:t>
+            </a:r>
+            <a:endParaRPr lang="en-US" dirty="0"/>
+          </a:p>
+        </p:txBody>
+      </p:sp>
+      <p:sp>
+        <p:nvSpPr>
+          <p:cNvPr id="4" name="Slide Number Placeholder 3"/>
+          <p:cNvSpPr>
+            <a:spLocks noGrp="1"/>
+          </p:cNvSpPr>
+          <p:nvPr>
+            <p:ph type="sldNum" sz="quarter" idx="10"/>
+          </p:nvPr>
+        </p:nvSpPr>
+        <p:spPr/>
+        <p:txBody>
+          <a:bodyPr/>
+          <a:lstStyle/>
+          <a:p>
+            <a:fld id="{56D28874-1678-3448-827B-018601F8A9DB}" type="slidenum">
+              <a:rPr lang="en-US" smtClean="0"/>
+              <a:pPr/>
+              <a:t>38</a:t>
+            </a:fld>
+            <a:endParaRPr lang="en-US"/>
+          </a:p>
+        </p:txBody>
+      </p:sp>
+    </p:spTree>
+  </p:cSld>
+  <p:clrMapOvr>
+    <a:masterClrMapping/>
+  </p:clrMapOvr>
+</p:notes>
+</file>
+
+<file path=ppt/notesSlides/notesSlide33.xml><?xml version="1.0" encoding="utf-8"?>
+<p:notes xmlns:a="http://schemas.openxmlformats.org/drawingml/2006/main" xmlns:r="http://schemas.openxmlformats.org/officeDocument/2006/relationships" xmlns:mc="http://schemas.openxmlformats.org/markup-compatibility/2006" xmlns:mv="urn:schemas-microsoft-com:mac:vml" xmlns:p="http://schemas.openxmlformats.org/presentationml/2006/main" mc:Ignorable="mv" mc:PreserveAttributes="mv:*">
+  <p:cSld>
+    <p:spTree>
+      <p:nvGrpSpPr>
+        <p:cNvPr id="1" name=""/>
+        <p:cNvGrpSpPr/>
+        <p:nvPr/>
+      </p:nvGrpSpPr>
+      <p:grpSpPr>
+        <a:xfrm>
+          <a:off x="0" y="0"/>
+          <a:ext cx="0" cy="0"/>
+          <a:chOff x="0" y="0"/>
+          <a:chExt cx="0" cy="0"/>
+        </a:xfrm>
+      </p:grpSpPr>
+      <p:sp>
+        <p:nvSpPr>
+          <p:cNvPr id="2" name="Slide Image Placeholder 1"/>
+          <p:cNvSpPr>
+            <a:spLocks noGrp="1" noRot="1" noChangeAspect="1"/>
+          </p:cNvSpPr>
+          <p:nvPr>
+            <p:ph type="sldImg"/>
+          </p:nvPr>
+        </p:nvSpPr>
+        <p:spPr/>
+      </p:sp>
+      <p:sp>
+        <p:nvSpPr>
+          <p:cNvPr id="3" name="Notes Placeholder 2"/>
+          <p:cNvSpPr>
+            <a:spLocks noGrp="1"/>
+          </p:cNvSpPr>
+          <p:nvPr>
+            <p:ph type="body" idx="1"/>
+          </p:nvPr>
+        </p:nvSpPr>
+        <p:spPr/>
+        <p:txBody>
+          <a:bodyPr>
+            <a:normAutofit/>
+          </a:bodyPr>
+          <a:lstStyle/>
+          <a:p>
+            <a:r>
+              <a:rPr lang="en-US" dirty="0" smtClean="0"/>
+              <a:t>Dates for submission to journal (month granularity); also specific journal</a:t>
+            </a:r>
+            <a:endParaRPr lang="en-US" dirty="0"/>
+          </a:p>
+        </p:txBody>
+      </p:sp>
+      <p:sp>
+        <p:nvSpPr>
+          <p:cNvPr id="4" name="Slide Number Placeholder 3"/>
+          <p:cNvSpPr>
+            <a:spLocks noGrp="1"/>
+          </p:cNvSpPr>
+          <p:nvPr>
+            <p:ph type="sldNum" sz="quarter" idx="10"/>
+          </p:nvPr>
+        </p:nvSpPr>
+        <p:spPr/>
+        <p:txBody>
+          <a:bodyPr/>
+          <a:lstStyle/>
+          <a:p>
+            <a:fld id="{56D28874-1678-3448-827B-018601F8A9DB}" type="slidenum">
+              <a:rPr lang="en-US" smtClean="0"/>
+              <a:pPr/>
+              <a:t>39</a:t>
+            </a:fld>
+            <a:endParaRPr lang="en-US"/>
+          </a:p>
+        </p:txBody>
+      </p:sp>
+    </p:spTree>
+  </p:cSld>
+  <p:clrMapOvr>
+    <a:masterClrMapping/>
+  </p:clrMapOvr>
+</p:notes>
+</file>
+
+<file path=ppt/notesSlides/notesSlide34.xml><?xml version="1.0" encoding="utf-8"?>
+<p:notes xmlns:a="http://schemas.openxmlformats.org/drawingml/2006/main" xmlns:r="http://schemas.openxmlformats.org/officeDocument/2006/relationships" xmlns:mc="http://schemas.openxmlformats.org/markup-compatibility/2006" xmlns:mv="urn:schemas-microsoft-com:mac:vml" xmlns:p="http://schemas.openxmlformats.org/presentationml/2006/main" mc:Ignorable="mv" mc:PreserveAttributes="mv:*">
+  <p:cSld>
+    <p:spTree>
+      <p:nvGrpSpPr>
+        <p:cNvPr id="1" name=""/>
+        <p:cNvGrpSpPr/>
+        <p:nvPr/>
+      </p:nvGrpSpPr>
+      <p:grpSpPr>
+        <a:xfrm>
+          <a:off x="0" y="0"/>
+          <a:ext cx="0" cy="0"/>
+          <a:chOff x="0" y="0"/>
+          <a:chExt cx="0" cy="0"/>
+        </a:xfrm>
+      </p:grpSpPr>
+      <p:sp>
+        <p:nvSpPr>
+          <p:cNvPr id="2" name="Slide Image Placeholder 1"/>
+          <p:cNvSpPr>
+            <a:spLocks noGrp="1" noRot="1" noChangeAspect="1"/>
+          </p:cNvSpPr>
+          <p:nvPr>
+            <p:ph type="sldImg"/>
+          </p:nvPr>
+        </p:nvSpPr>
+        <p:spPr/>
+      </p:sp>
+      <p:sp>
+        <p:nvSpPr>
+          <p:cNvPr id="3" name="Notes Placeholder 2"/>
+          <p:cNvSpPr>
+            <a:spLocks noGrp="1"/>
+          </p:cNvSpPr>
+          <p:nvPr>
+            <p:ph type="body" idx="1"/>
+          </p:nvPr>
+        </p:nvSpPr>
+        <p:spPr/>
+        <p:txBody>
+          <a:bodyPr>
+            <a:normAutofit/>
+          </a:bodyPr>
+          <a:lstStyle/>
+          <a:p>
+            <a:r>
+              <a:rPr lang="en-US" dirty="0" smtClean="0"/>
+              <a:t>TODO:  add Blast,</a:t>
+            </a:r>
+            <a:r>
+              <a:rPr lang="en-US" baseline="0" dirty="0" smtClean="0"/>
+              <a:t> </a:t>
+            </a:r>
+            <a:r>
+              <a:rPr lang="en-US" baseline="0" dirty="0" err="1" smtClean="0"/>
+              <a:t>Ukkonen</a:t>
+            </a:r>
+            <a:r>
+              <a:rPr lang="en-US" baseline="0" dirty="0" smtClean="0"/>
+              <a:t>, Smith-Waterman</a:t>
+            </a:r>
+            <a:endParaRPr lang="en-US" dirty="0"/>
+          </a:p>
+        </p:txBody>
+      </p:sp>
+      <p:sp>
+        <p:nvSpPr>
+          <p:cNvPr id="4" name="Slide Number Placeholder 3"/>
+          <p:cNvSpPr>
+            <a:spLocks noGrp="1"/>
+          </p:cNvSpPr>
+          <p:nvPr>
+            <p:ph type="sldNum" sz="quarter" idx="10"/>
+          </p:nvPr>
+        </p:nvSpPr>
+        <p:spPr/>
+        <p:txBody>
+          <a:bodyPr/>
+          <a:lstStyle/>
+          <a:p>
+            <a:fld id="{56D28874-1678-3448-827B-018601F8A9DB}" type="slidenum">
+              <a:rPr lang="en-US" smtClean="0"/>
+              <a:pPr/>
+              <a:t>41</a:t>
+            </a:fld>
+            <a:endParaRPr lang="en-US"/>
+          </a:p>
+        </p:txBody>
+      </p:sp>
+    </p:spTree>
+  </p:cSld>
+  <p:clrMapOvr>
+    <a:masterClrMapping/>
+  </p:clrMapOvr>
+</p:notes>
+</file>
+
+<file path=ppt/notesSlides/notesSlide35.xml><?xml version="1.0" encoding="utf-8"?>
+<p:notes xmlns:a="http://schemas.openxmlformats.org/drawingml/2006/main" xmlns:r="http://schemas.openxmlformats.org/officeDocument/2006/relationships" xmlns:mc="http://schemas.openxmlformats.org/markup-compatibility/2006" xmlns:mv="urn:schemas-microsoft-com:mac:vml" xmlns:p="http://schemas.openxmlformats.org/presentationml/2006/main" mc:Ignorable="mv" mc:PreserveAttributes="mv:*">
+  <p:cSld>
+    <p:spTree>
+      <p:nvGrpSpPr>
+        <p:cNvPr id="1" name=""/>
+        <p:cNvGrpSpPr/>
+        <p:nvPr/>
+      </p:nvGrpSpPr>
+      <p:grpSpPr>
+        <a:xfrm>
+          <a:off x="0" y="0"/>
+          <a:ext cx="0" cy="0"/>
+          <a:chOff x="0" y="0"/>
+          <a:chExt cx="0" cy="0"/>
+        </a:xfrm>
+      </p:grpSpPr>
+      <p:sp>
+        <p:nvSpPr>
+          <p:cNvPr id="2" name="Slide Image Placeholder 1"/>
+          <p:cNvSpPr>
+            <a:spLocks noGrp="1" noRot="1" noChangeAspect="1"/>
+          </p:cNvSpPr>
+          <p:nvPr>
+            <p:ph type="sldImg"/>
+          </p:nvPr>
+        </p:nvSpPr>
+        <p:spPr/>
+      </p:sp>
+      <p:sp>
+        <p:nvSpPr>
+          <p:cNvPr id="3" name="Notes Placeholder 2"/>
+          <p:cNvSpPr>
+            <a:spLocks noGrp="1"/>
+          </p:cNvSpPr>
+          <p:nvPr>
+            <p:ph type="body" idx="1"/>
+          </p:nvPr>
+        </p:nvSpPr>
+        <p:spPr/>
+        <p:txBody>
+          <a:bodyPr>
+            <a:normAutofit/>
+          </a:bodyPr>
+          <a:lstStyle/>
+          <a:p>
+            <a:r>
+              <a:rPr lang="en-US" dirty="0" smtClean="0"/>
+              <a:t>Segue:  let’s talk more about what’s involved in the data processing</a:t>
+            </a:r>
+          </a:p>
+          <a:p>
+            <a:r>
+              <a:rPr lang="en-US" dirty="0" smtClean="0"/>
+              <a:t>You have a bunch of reads, want to put them together (puzzle analogy)</a:t>
+            </a:r>
+          </a:p>
+          <a:p>
+            <a:r>
+              <a:rPr lang="en-US" dirty="0" smtClean="0"/>
+              <a:t>You</a:t>
+            </a:r>
+            <a:r>
+              <a:rPr lang="en-US" baseline="0" dirty="0" smtClean="0"/>
+              <a:t> use a reference genome (like the picture on the puzzle box)</a:t>
+            </a:r>
+            <a:endParaRPr lang="en-US" dirty="0" smtClean="0"/>
+          </a:p>
+          <a:p>
+            <a:r>
+              <a:rPr lang="en-US" dirty="0" smtClean="0"/>
+              <a:t>Variants appear in reads</a:t>
+            </a:r>
+          </a:p>
+          <a:p>
+            <a:r>
+              <a:rPr lang="en-US" dirty="0" smtClean="0"/>
+              <a:t>Align reads</a:t>
+            </a:r>
+          </a:p>
+          <a:p>
+            <a:r>
+              <a:rPr lang="en-US" dirty="0" smtClean="0"/>
+              <a:t>For a particular position, jointly consider reads aligned there</a:t>
+            </a:r>
+          </a:p>
+          <a:p>
+            <a:r>
+              <a:rPr lang="en-US" dirty="0" smtClean="0"/>
+              <a:t>Consensus =&gt; call a variant</a:t>
+            </a:r>
+          </a:p>
+          <a:p>
+            <a:r>
+              <a:rPr lang="en-US" dirty="0" smtClean="0"/>
+              <a:t>Do this for all positions =&gt; reconstructed genome</a:t>
+            </a:r>
+          </a:p>
+          <a:p>
+            <a:r>
+              <a:rPr lang="en-US" dirty="0" smtClean="0"/>
+              <a:t>Remove 0.1%</a:t>
+            </a:r>
+            <a:r>
+              <a:rPr lang="en-US" baseline="0" dirty="0" smtClean="0"/>
+              <a:t> figure since it’s just for </a:t>
+            </a:r>
+            <a:r>
+              <a:rPr lang="en-US" baseline="0" dirty="0" err="1" smtClean="0"/>
+              <a:t>SNPs</a:t>
+            </a:r>
+            <a:r>
+              <a:rPr lang="en-US" baseline="0" dirty="0" smtClean="0"/>
+              <a:t>/small </a:t>
+            </a:r>
+            <a:r>
+              <a:rPr lang="en-US" baseline="0" dirty="0" err="1" smtClean="0"/>
+              <a:t>indels</a:t>
+            </a:r>
+            <a:endParaRPr lang="en-US" dirty="0"/>
+          </a:p>
+        </p:txBody>
+      </p:sp>
+      <p:sp>
+        <p:nvSpPr>
+          <p:cNvPr id="4" name="Slide Number Placeholder 3"/>
+          <p:cNvSpPr>
+            <a:spLocks noGrp="1"/>
+          </p:cNvSpPr>
+          <p:nvPr>
+            <p:ph type="sldNum" sz="quarter" idx="10"/>
+          </p:nvPr>
+        </p:nvSpPr>
+        <p:spPr/>
+        <p:txBody>
+          <a:bodyPr/>
+          <a:lstStyle/>
+          <a:p>
+            <a:fld id="{69091A11-F846-B944-867A-2BC3F162A9B3}" type="slidenum">
+              <a:rPr lang="en-US" smtClean="0"/>
+              <a:pPr/>
+              <a:t>44</a:t>
+            </a:fld>
+            <a:endParaRPr lang="en-US"/>
+          </a:p>
+        </p:txBody>
+      </p:sp>
+    </p:spTree>
+  </p:cSld>
+  <p:clrMapOvr>
+    <a:masterClrMapping/>
+  </p:clrMapOvr>
+</p:notes>
+</file>
+
+<file path=ppt/notesSlides/notesSlide36.xml><?xml version="1.0" encoding="utf-8"?>
+<p:notes xmlns:a="http://schemas.openxmlformats.org/drawingml/2006/main" xmlns:r="http://schemas.openxmlformats.org/officeDocument/2006/relationships" xmlns:mc="http://schemas.openxmlformats.org/markup-compatibility/2006" xmlns:mv="urn:schemas-microsoft-com:mac:vml" xmlns:p="http://schemas.openxmlformats.org/presentationml/2006/main" mc:Ignorable="mv" mc:PreserveAttributes="mv:*">
+  <p:cSld>
+    <p:spTree>
+      <p:nvGrpSpPr>
+        <p:cNvPr id="1" name=""/>
+        <p:cNvGrpSpPr/>
+        <p:nvPr/>
+      </p:nvGrpSpPr>
+      <p:grpSpPr>
+        <a:xfrm>
+          <a:off x="0" y="0"/>
+          <a:ext cx="0" cy="0"/>
+          <a:chOff x="0" y="0"/>
+          <a:chExt cx="0" cy="0"/>
+        </a:xfrm>
+      </p:grpSpPr>
+      <p:sp>
+        <p:nvSpPr>
+          <p:cNvPr id="2" name="Slide Image Placeholder 1"/>
+          <p:cNvSpPr>
+            <a:spLocks noGrp="1" noRot="1" noChangeAspect="1"/>
+          </p:cNvSpPr>
+          <p:nvPr>
+            <p:ph type="sldImg"/>
+          </p:nvPr>
+        </p:nvSpPr>
+        <p:spPr/>
+      </p:sp>
+      <p:sp>
+        <p:nvSpPr>
+          <p:cNvPr id="3" name="Notes Placeholder 2"/>
+          <p:cNvSpPr>
+            <a:spLocks noGrp="1"/>
+          </p:cNvSpPr>
+          <p:nvPr>
+            <p:ph type="body" idx="1"/>
+          </p:nvPr>
+        </p:nvSpPr>
+        <p:spPr/>
+        <p:txBody>
+          <a:bodyPr>
+            <a:normAutofit/>
+          </a:bodyPr>
+          <a:lstStyle/>
+          <a:p>
+            <a:r>
+              <a:rPr lang="en-US" dirty="0" smtClean="0"/>
+              <a:t>TODO:</a:t>
+            </a:r>
+            <a:r>
+              <a:rPr lang="en-US" baseline="0" dirty="0" smtClean="0"/>
+              <a:t>  </a:t>
+            </a:r>
+            <a:r>
+              <a:rPr lang="en-US" dirty="0" smtClean="0"/>
+              <a:t>Add reference</a:t>
+            </a:r>
+            <a:r>
+              <a:rPr lang="en-US" baseline="0" dirty="0" smtClean="0"/>
+              <a:t> to SW, </a:t>
+            </a:r>
+            <a:r>
+              <a:rPr lang="en-US" baseline="0" dirty="0" err="1" smtClean="0"/>
+              <a:t>Ukkonen</a:t>
+            </a:r>
+            <a:endParaRPr lang="en-US" dirty="0"/>
+          </a:p>
+        </p:txBody>
+      </p:sp>
+      <p:sp>
+        <p:nvSpPr>
+          <p:cNvPr id="4" name="Slide Number Placeholder 3"/>
+          <p:cNvSpPr>
+            <a:spLocks noGrp="1"/>
+          </p:cNvSpPr>
+          <p:nvPr>
+            <p:ph type="sldNum" sz="quarter" idx="10"/>
+          </p:nvPr>
+        </p:nvSpPr>
+        <p:spPr/>
+        <p:txBody>
+          <a:bodyPr/>
+          <a:lstStyle/>
+          <a:p>
+            <a:fld id="{56D28874-1678-3448-827B-018601F8A9DB}" type="slidenum">
+              <a:rPr lang="en-US" smtClean="0"/>
+              <a:pPr/>
+              <a:t>47</a:t>
+            </a:fld>
+            <a:endParaRPr lang="en-US"/>
+          </a:p>
+        </p:txBody>
+      </p:sp>
+    </p:spTree>
+  </p:cSld>
+  <p:clrMapOvr>
+    <a:masterClrMapping/>
+  </p:clrMapOvr>
+</p:notes>
+</file>
+
+<file path=ppt/notesSlides/notesSlide37.xml><?xml version="1.0" encoding="utf-8"?>
+<p:notes xmlns:a="http://schemas.openxmlformats.org/drawingml/2006/main" xmlns:r="http://schemas.openxmlformats.org/officeDocument/2006/relationships" xmlns:mc="http://schemas.openxmlformats.org/markup-compatibility/2006" xmlns:mv="urn:schemas-microsoft-com:mac:vml" xmlns:p="http://schemas.openxmlformats.org/presentationml/2006/main" mc:Ignorable="mv" mc:PreserveAttributes="mv:*">
+  <p:cSld>
+    <p:spTree>
+      <p:nvGrpSpPr>
+        <p:cNvPr id="1" name=""/>
+        <p:cNvGrpSpPr/>
+        <p:nvPr/>
+      </p:nvGrpSpPr>
+      <p:grpSpPr>
+        <a:xfrm>
+          <a:off x="0" y="0"/>
+          <a:ext cx="0" cy="0"/>
+          <a:chOff x="0" y="0"/>
+          <a:chExt cx="0" cy="0"/>
+        </a:xfrm>
+      </p:grpSpPr>
+      <p:sp>
+        <p:nvSpPr>
+          <p:cNvPr id="2" name="Slide Image Placeholder 1"/>
+          <p:cNvSpPr>
+            <a:spLocks noGrp="1" noRot="1" noChangeAspect="1"/>
+          </p:cNvSpPr>
+          <p:nvPr>
+            <p:ph type="sldImg"/>
+          </p:nvPr>
+        </p:nvSpPr>
+        <p:spPr/>
+      </p:sp>
+      <p:sp>
+        <p:nvSpPr>
+          <p:cNvPr id="3" name="Notes Placeholder 2"/>
+          <p:cNvSpPr>
+            <a:spLocks noGrp="1"/>
+          </p:cNvSpPr>
+          <p:nvPr>
+            <p:ph type="body" idx="1"/>
+          </p:nvPr>
+        </p:nvSpPr>
+        <p:spPr/>
+        <p:txBody>
+          <a:bodyPr>
+            <a:normAutofit/>
+          </a:bodyPr>
+          <a:lstStyle/>
+          <a:p>
+            <a:r>
+              <a:rPr lang="en-US" dirty="0" smtClean="0"/>
+              <a:t>TODO:</a:t>
+            </a:r>
+            <a:r>
+              <a:rPr lang="en-US" baseline="0" dirty="0" smtClean="0"/>
+              <a:t>  quote some #</a:t>
+            </a:r>
+            <a:r>
+              <a:rPr lang="en-US" baseline="0" dirty="0" err="1" smtClean="0"/>
+              <a:t>s</a:t>
+            </a:r>
+            <a:r>
+              <a:rPr lang="en-US" baseline="0" dirty="0" smtClean="0"/>
+              <a:t> for runtime of these algorithms</a:t>
+            </a:r>
+          </a:p>
+          <a:p>
+            <a:r>
+              <a:rPr lang="en-US" baseline="0" dirty="0" smtClean="0"/>
+              <a:t>TODO:  add some newer citations</a:t>
+            </a:r>
+            <a:endParaRPr lang="en-US" dirty="0"/>
+          </a:p>
+        </p:txBody>
+      </p:sp>
+      <p:sp>
+        <p:nvSpPr>
+          <p:cNvPr id="4" name="Slide Number Placeholder 3"/>
+          <p:cNvSpPr>
+            <a:spLocks noGrp="1"/>
+          </p:cNvSpPr>
+          <p:nvPr>
+            <p:ph type="sldNum" sz="quarter" idx="10"/>
+          </p:nvPr>
+        </p:nvSpPr>
+        <p:spPr/>
+        <p:txBody>
+          <a:bodyPr/>
+          <a:lstStyle/>
+          <a:p>
+            <a:fld id="{56D28874-1678-3448-827B-018601F8A9DB}" type="slidenum">
+              <a:rPr lang="en-US" smtClean="0"/>
+              <a:pPr/>
+              <a:t>48</a:t>
+            </a:fld>
+            <a:endParaRPr lang="en-US"/>
+          </a:p>
+        </p:txBody>
+      </p:sp>
+    </p:spTree>
+  </p:cSld>
+  <p:clrMapOvr>
+    <a:masterClrMapping/>
+  </p:clrMapOvr>
+</p:notes>
+</file>
+
+<file path=ppt/notesSlides/notesSlide38.xml><?xml version="1.0" encoding="utf-8"?>
+<p:notes xmlns:a="http://schemas.openxmlformats.org/drawingml/2006/main" xmlns:r="http://schemas.openxmlformats.org/officeDocument/2006/relationships" xmlns:mc="http://schemas.openxmlformats.org/markup-compatibility/2006" xmlns:mv="urn:schemas-microsoft-com:mac:vml" xmlns:p="http://schemas.openxmlformats.org/presentationml/2006/main" mc:Ignorable="mv" mc:PreserveAttributes="mv:*">
+  <p:cSld>
+    <p:spTree>
+      <p:nvGrpSpPr>
+        <p:cNvPr id="1" name=""/>
+        <p:cNvGrpSpPr/>
+        <p:nvPr/>
+      </p:nvGrpSpPr>
+      <p:grpSpPr>
+        <a:xfrm>
+          <a:off x="0" y="0"/>
+          <a:ext cx="0" cy="0"/>
+          <a:chOff x="0" y="0"/>
+          <a:chExt cx="0" cy="0"/>
+        </a:xfrm>
+      </p:grpSpPr>
+      <p:sp>
+        <p:nvSpPr>
+          <p:cNvPr id="2" name="Slide Image Placeholder 1"/>
+          <p:cNvSpPr>
+            <a:spLocks noGrp="1" noRot="1" noChangeAspect="1"/>
+          </p:cNvSpPr>
+          <p:nvPr>
+            <p:ph type="sldImg"/>
+          </p:nvPr>
+        </p:nvSpPr>
+        <p:spPr/>
+      </p:sp>
+      <p:sp>
+        <p:nvSpPr>
+          <p:cNvPr id="3" name="Notes Placeholder 2"/>
+          <p:cNvSpPr>
+            <a:spLocks noGrp="1"/>
+          </p:cNvSpPr>
+          <p:nvPr>
+            <p:ph type="body" idx="1"/>
+          </p:nvPr>
+        </p:nvSpPr>
+        <p:spPr/>
+        <p:txBody>
+          <a:bodyPr>
+            <a:normAutofit/>
+          </a:bodyPr>
+          <a:lstStyle/>
+          <a:p>
+            <a:r>
+              <a:rPr lang="en-US" dirty="0" smtClean="0"/>
+              <a:t>TODO: </a:t>
+            </a:r>
+            <a:r>
+              <a:rPr lang="en-US" baseline="0" dirty="0" smtClean="0"/>
+              <a:t> add real #</a:t>
+            </a:r>
+            <a:r>
+              <a:rPr lang="en-US" baseline="0" dirty="0" err="1" smtClean="0"/>
+              <a:t>s</a:t>
+            </a:r>
+            <a:r>
+              <a:rPr lang="en-US" baseline="0" dirty="0" smtClean="0"/>
+              <a:t> for </a:t>
+            </a:r>
+            <a:r>
+              <a:rPr lang="en-US" baseline="0" dirty="0" err="1" smtClean="0"/>
+              <a:t>sim</a:t>
+            </a:r>
+            <a:r>
+              <a:rPr lang="en-US" baseline="0" dirty="0" smtClean="0"/>
+              <a:t>-aware SNAP</a:t>
+            </a:r>
+          </a:p>
+          <a:p>
+            <a:r>
+              <a:rPr lang="en-US" baseline="0" dirty="0" smtClean="0"/>
+              <a:t>Aligning 1e6 simulated reads to the whole genome, single end, best matcher</a:t>
+            </a:r>
+          </a:p>
+          <a:p>
+            <a:r>
+              <a:rPr lang="en-US" baseline="0" dirty="0" smtClean="0"/>
+              <a:t>Used cc2.8xlarge</a:t>
+            </a:r>
+          </a:p>
+          <a:p>
+            <a:endParaRPr lang="en-US" baseline="0" dirty="0" smtClean="0"/>
+          </a:p>
+          <a:p>
+            <a:r>
+              <a:rPr lang="en-US" baseline="0" dirty="0" smtClean="0"/>
+              <a:t>** may change this to be from c95</a:t>
+            </a:r>
+            <a:endParaRPr lang="en-US" dirty="0"/>
+          </a:p>
+        </p:txBody>
+      </p:sp>
+      <p:sp>
+        <p:nvSpPr>
+          <p:cNvPr id="4" name="Slide Number Placeholder 3"/>
+          <p:cNvSpPr>
+            <a:spLocks noGrp="1"/>
+          </p:cNvSpPr>
+          <p:nvPr>
+            <p:ph type="sldNum" sz="quarter" idx="10"/>
+          </p:nvPr>
+        </p:nvSpPr>
+        <p:spPr/>
+        <p:txBody>
+          <a:bodyPr/>
+          <a:lstStyle/>
+          <a:p>
+            <a:fld id="{56D28874-1678-3448-827B-018601F8A9DB}" type="slidenum">
+              <a:rPr lang="en-US" smtClean="0"/>
+              <a:pPr/>
+              <a:t>50</a:t>
             </a:fld>
             <a:endParaRPr lang="en-US"/>
           </a:p>
@@ -5050,6 +6343,34 @@
           </a:bodyPr>
           <a:lstStyle/>
           <a:p>
+            <a:r>
+              <a:rPr lang="en-US" dirty="0" smtClean="0"/>
+              <a:t>SS:  plural on positions</a:t>
+            </a:r>
+          </a:p>
+          <a:p>
+            <a:r>
+              <a:rPr lang="en-US" dirty="0" smtClean="0"/>
+              <a:t>RX:  edit</a:t>
+            </a:r>
+            <a:r>
+              <a:rPr lang="en-US" baseline="0" dirty="0" smtClean="0"/>
+              <a:t> distance is only a proxy for correct location</a:t>
+            </a:r>
+          </a:p>
+          <a:p>
+            <a:r>
+              <a:rPr lang="en-US" baseline="0" dirty="0" smtClean="0"/>
+              <a:t>TS:  makes sense to do alignment </a:t>
+            </a:r>
+            <a:r>
+              <a:rPr lang="en-US" baseline="0" dirty="0" err="1" smtClean="0"/>
+              <a:t>b/c</a:t>
+            </a:r>
+            <a:r>
+              <a:rPr lang="en-US" baseline="0" dirty="0" smtClean="0"/>
+              <a:t> we expect reads to be similar to reference</a:t>
+            </a:r>
             <a:endParaRPr lang="en-US" dirty="0"/>
           </a:p>
         </p:txBody>
@@ -5072,7 +6393,7 @@
             <a:fld id="{56D28874-1678-3448-827B-018601F8A9DB}" type="slidenum">
               <a:rPr lang="en-US" smtClean="0"/>
               <a:pPr/>
-              <a:t>6</a:t>
+              <a:t>5</a:t>
             </a:fld>
             <a:endParaRPr lang="en-US"/>
           </a:p>
@@ -5132,7 +6453,31 @@
           </a:bodyPr>
           <a:lstStyle/>
           <a:p>
-            <a:endParaRPr lang="en-US" dirty="0"/>
+            <a:r>
+              <a:rPr lang="en-US" dirty="0" smtClean="0"/>
+              <a:t>BT:</a:t>
+            </a:r>
+            <a:r>
+              <a:rPr lang="en-US" baseline="0" dirty="0" smtClean="0"/>
+              <a:t>  make it clear that I worked on SNAP too</a:t>
+            </a:r>
+          </a:p>
+          <a:p>
+            <a:endParaRPr lang="en-US" baseline="0" dirty="0" smtClean="0"/>
+          </a:p>
+          <a:p>
+            <a:r>
+              <a:rPr lang="en-US" baseline="0" dirty="0" smtClean="0"/>
+              <a:t>MZ:  could fix this slide </a:t>
+            </a:r>
+            <a:r>
+              <a:rPr lang="en-US" baseline="0" dirty="0" err="1" smtClean="0"/>
+              <a:t>b/c</a:t>
+            </a:r>
+            <a:r>
+              <a:rPr lang="en-US" baseline="0" dirty="0" smtClean="0"/>
+              <a:t> this is meant to keep attention in a longer talk</a:t>
+            </a:r>
           </a:p>
         </p:txBody>
       </p:sp>
@@ -5154,7 +6499,7 @@
             <a:fld id="{56D28874-1678-3448-827B-018601F8A9DB}" type="slidenum">
               <a:rPr lang="en-US" smtClean="0"/>
               <a:pPr/>
-              <a:t>7</a:t>
+              <a:t>6</a:t>
             </a:fld>
             <a:endParaRPr lang="en-US"/>
           </a:p>
@@ -5216,11 +6561,7 @@
           <a:p>
             <a:r>
               <a:rPr lang="en-US" dirty="0" smtClean="0"/>
-              <a:t>Talk about how increasing read lengths &amp; server memories make hash-based</a:t>
-            </a:r>
-            <a:r>
-              <a:rPr lang="en-US" baseline="0" dirty="0" smtClean="0"/>
-              <a:t> aligners more practical</a:t>
+              <a:t>Make it clearer here why picked the seed based</a:t>
             </a:r>
             <a:endParaRPr lang="en-US" dirty="0"/>
           </a:p>
@@ -5244,7 +6585,7 @@
             <a:fld id="{56D28874-1678-3448-827B-018601F8A9DB}" type="slidenum">
               <a:rPr lang="en-US" smtClean="0"/>
               <a:pPr/>
-              <a:t>8</a:t>
+              <a:t>7</a:t>
             </a:fld>
             <a:endParaRPr lang="en-US"/>
           </a:p>
@@ -5306,15 +6647,30 @@
           <a:p>
             <a:r>
               <a:rPr lang="en-US" dirty="0" smtClean="0"/>
-              <a:t>TODO:  </a:t>
-            </a:r>
-            <a:r>
-              <a:rPr lang="en-US" dirty="0" err="1" smtClean="0"/>
-              <a:t>Yun</a:t>
-            </a:r>
-            <a:r>
-              <a:rPr lang="en-US" dirty="0" smtClean="0"/>
-              <a:t> asks for column with speedup</a:t>
+              <a:t>Talk about how increasing read lengths &amp; server memories make hash-based</a:t>
+            </a:r>
+            <a:r>
+              <a:rPr lang="en-US" baseline="0" dirty="0" smtClean="0"/>
+              <a:t> aligners more </a:t>
+            </a:r>
+            <a:r>
+              <a:rPr lang="en-US" baseline="0" dirty="0" smtClean="0"/>
+              <a:t>practical</a:t>
+            </a:r>
+          </a:p>
+          <a:p>
+            <a:endParaRPr lang="en-US" baseline="0" dirty="0" smtClean="0"/>
+          </a:p>
+          <a:p>
+            <a:r>
+              <a:rPr lang="en-US" baseline="0" dirty="0" smtClean="0"/>
+              <a:t>BT:  make it clearer why going back to seed-based (fix cons, keep pros)</a:t>
+            </a:r>
+          </a:p>
+          <a:p>
+            <a:r>
+              <a:rPr lang="en-US" baseline="0" dirty="0" smtClean="0"/>
+              <a:t>TS:  seed-based was designed for a different problem (multiple alignment of shorter sequences); we’re attacking a slightly different problem, so it makes sense to use longer seeds</a:t>
             </a:r>
             <a:endParaRPr lang="en-US" dirty="0"/>
           </a:p>
@@ -5338,7 +6694,7 @@
             <a:fld id="{56D28874-1678-3448-827B-018601F8A9DB}" type="slidenum">
               <a:rPr lang="en-US" smtClean="0"/>
               <a:pPr/>
-              <a:t>9</a:t>
+              <a:t>8</a:t>
             </a:fld>
             <a:endParaRPr lang="en-US"/>
           </a:p>
@@ -5400,20 +6756,37 @@
           <a:p>
             <a:r>
               <a:rPr lang="en-US" dirty="0" smtClean="0"/>
-              <a:t>What makes alignment hard is the similar regions</a:t>
-            </a:r>
-          </a:p>
-          <a:p>
-            <a:endParaRPr lang="en-US" dirty="0" smtClean="0"/>
-          </a:p>
-          <a:p>
+              <a:t>TODO:  </a:t>
+            </a:r>
+            <a:r>
+              <a:rPr lang="en-US" dirty="0" err="1" smtClean="0"/>
+              <a:t>Yun</a:t>
+            </a:r>
             <a:r>
               <a:rPr lang="en-US" dirty="0" smtClean="0"/>
-              <a:t>These</a:t>
-            </a:r>
-            <a:r>
-              <a:rPr lang="en-US" baseline="0" dirty="0" smtClean="0"/>
-              <a:t> graphs show that what makes things hard is the similar regions – you really DO want to compare against tons of locations rather than just throwing those reads out</a:t>
+              <a:t> asks for column with </a:t>
+            </a:r>
+            <a:r>
+              <a:rPr lang="en-US" dirty="0" smtClean="0"/>
+              <a:t>speedup</a:t>
+            </a:r>
+          </a:p>
+          <a:p>
+            <a:r>
+              <a:rPr lang="en-US" dirty="0" smtClean="0"/>
+              <a:t>SS:  how to get error</a:t>
+            </a:r>
+          </a:p>
+          <a:p>
+            <a:r>
+              <a:rPr lang="en-US" dirty="0" smtClean="0"/>
+              <a:t>BT:  how to simulate reads</a:t>
+            </a:r>
+          </a:p>
+          <a:p>
+            <a:r>
+              <a:rPr lang="en-US" dirty="0" smtClean="0"/>
+              <a:t>MZ:  might want to show real data</a:t>
             </a:r>
             <a:endParaRPr lang="en-US" dirty="0"/>
           </a:p>
@@ -5434,10 +6807,10 @@
           <a:bodyPr/>
           <a:lstStyle/>
           <a:p>
-            <a:fld id="{D595E2EF-4AF3-F948-88CD-8E02C76C0292}" type="slidenum">
+            <a:fld id="{56D28874-1678-3448-827B-018601F8A9DB}" type="slidenum">
               <a:rPr lang="en-US" smtClean="0"/>
               <a:pPr/>
-              <a:t>11</a:t>
+              <a:t>9</a:t>
             </a:fld>
             <a:endParaRPr lang="en-US"/>
           </a:p>
@@ -5497,6 +6870,65 @@
           </a:bodyPr>
           <a:lstStyle/>
           <a:p>
+            <a:r>
+              <a:rPr lang="en-US" dirty="0" smtClean="0"/>
+              <a:t>What makes alignment hard is the similar regions</a:t>
+            </a:r>
+          </a:p>
+          <a:p>
+            <a:endParaRPr lang="en-US" dirty="0" smtClean="0"/>
+          </a:p>
+          <a:p>
+            <a:r>
+              <a:rPr lang="en-US" dirty="0" smtClean="0"/>
+              <a:t>These</a:t>
+            </a:r>
+            <a:r>
+              <a:rPr lang="en-US" baseline="0" dirty="0" smtClean="0"/>
+              <a:t> graphs show that what makes things hard is the similar regions – you really DO want to compare against tons of locations rather than just throwing those reads </a:t>
+            </a:r>
+            <a:r>
+              <a:rPr lang="en-US" baseline="0" dirty="0" smtClean="0"/>
+              <a:t>out</a:t>
+            </a:r>
+          </a:p>
+          <a:p>
+            <a:endParaRPr lang="en-US" baseline="0" dirty="0" smtClean="0"/>
+          </a:p>
+          <a:p>
+            <a:r>
+              <a:rPr lang="en-US" baseline="0" dirty="0" smtClean="0"/>
+              <a:t>MZ:  explanation of </a:t>
+            </a:r>
+            <a:r>
+              <a:rPr lang="en-US" baseline="0" dirty="0" err="1" smtClean="0"/>
+              <a:t>maxHits</a:t>
+            </a:r>
+            <a:r>
+              <a:rPr lang="en-US" baseline="0" dirty="0" smtClean="0"/>
+              <a:t> (BT agrees)</a:t>
+            </a:r>
+          </a:p>
+          <a:p>
+            <a:r>
+              <a:rPr lang="en-US" baseline="0" dirty="0" smtClean="0"/>
+              <a:t>Say that the main cause of slowdown &amp; inaccuracy is similarity</a:t>
+            </a:r>
+          </a:p>
+          <a:p>
+            <a:r>
+              <a:rPr lang="en-US" baseline="0" dirty="0" smtClean="0"/>
+              <a:t>Might want to put more after this about the similar regions</a:t>
+            </a:r>
+          </a:p>
+          <a:p>
+            <a:endParaRPr lang="en-US" baseline="0" dirty="0" smtClean="0"/>
+          </a:p>
+          <a:p>
+            <a:r>
+              <a:rPr lang="en-US" baseline="0" dirty="0" smtClean="0"/>
+              <a:t>BT:  graphs are hard to parse</a:t>
+            </a:r>
             <a:endParaRPr lang="en-US" dirty="0"/>
           </a:p>
         </p:txBody>
@@ -5516,10 +6948,10 @@
           <a:bodyPr/>
           <a:lstStyle/>
           <a:p>
-            <a:fld id="{56D28874-1678-3448-827B-018601F8A9DB}" type="slidenum">
+            <a:fld id="{D595E2EF-4AF3-F948-88CD-8E02C76C0292}" type="slidenum">
               <a:rPr lang="en-US" smtClean="0"/>
               <a:pPr/>
-              <a:t>12</a:t>
+              <a:t>11</a:t>
             </a:fld>
             <a:endParaRPr lang="en-US"/>
           </a:p>
@@ -5714,7 +7146,8 @@
           <a:p>
             <a:fld id="{10060FB0-6128-1E45-9FA9-ABDA7EA77B94}" type="datetime1">
               <a:rPr lang="en-US" smtClean="0"/>
-              <a:t>12/5/12</a:t>
+              <a:pPr/>
+              <a:t>12/6/12</a:t>
             </a:fld>
             <a:endParaRPr lang="en-US"/>
           </a:p>
@@ -5880,7 +7313,8 @@
           <a:p>
             <a:fld id="{08F027EE-F530-CA48-B7DA-87E40546CC83}" type="datetime1">
               <a:rPr lang="en-US" smtClean="0"/>
-              <a:t>12/5/12</a:t>
+              <a:pPr/>
+              <a:t>12/6/12</a:t>
             </a:fld>
             <a:endParaRPr lang="en-US"/>
           </a:p>
@@ -6056,7 +7490,8 @@
           <a:p>
             <a:fld id="{F531429A-2737-7E4A-9706-6FD1E33BCB7C}" type="datetime1">
               <a:rPr lang="en-US" smtClean="0"/>
-              <a:t>12/5/12</a:t>
+              <a:pPr/>
+              <a:t>12/6/12</a:t>
             </a:fld>
             <a:endParaRPr lang="en-US"/>
           </a:p>
@@ -6222,7 +7657,8 @@
           <a:p>
             <a:fld id="{40C24C0E-76B1-D84B-BE78-A90D5FDA0EE4}" type="datetime1">
               <a:rPr lang="en-US" smtClean="0"/>
-              <a:t>12/5/12</a:t>
+              <a:pPr/>
+              <a:t>12/6/12</a:t>
             </a:fld>
             <a:endParaRPr lang="en-US"/>
           </a:p>
@@ -6464,7 +7900,8 @@
           <a:p>
             <a:fld id="{7078779B-F499-FA4E-BD59-6F7F65E29069}" type="datetime1">
               <a:rPr lang="en-US" smtClean="0"/>
-              <a:t>12/5/12</a:t>
+              <a:pPr/>
+              <a:t>12/6/12</a:t>
             </a:fld>
             <a:endParaRPr lang="en-US"/>
           </a:p>
@@ -6748,7 +8185,8 @@
           <a:p>
             <a:fld id="{A13CA208-A4A4-DF48-B085-E2FB50AFBE49}" type="datetime1">
               <a:rPr lang="en-US" smtClean="0"/>
-              <a:t>12/5/12</a:t>
+              <a:pPr/>
+              <a:t>12/6/12</a:t>
             </a:fld>
             <a:endParaRPr lang="en-US"/>
           </a:p>
@@ -7166,7 +8604,8 @@
           <a:p>
             <a:fld id="{F6404613-C41F-C04B-971A-16AF0051031E}" type="datetime1">
               <a:rPr lang="en-US" smtClean="0"/>
-              <a:t>12/5/12</a:t>
+              <a:pPr/>
+              <a:t>12/6/12</a:t>
             </a:fld>
             <a:endParaRPr lang="en-US"/>
           </a:p>
@@ -7280,7 +8719,8 @@
           <a:p>
             <a:fld id="{97F332A1-CF81-D242-9D6D-0A6B3E342F01}" type="datetime1">
               <a:rPr lang="en-US" smtClean="0"/>
-              <a:t>12/5/12</a:t>
+              <a:pPr/>
+              <a:t>12/6/12</a:t>
             </a:fld>
             <a:endParaRPr lang="en-US"/>
           </a:p>
@@ -7371,7 +8811,8 @@
           <a:p>
             <a:fld id="{2A0A6130-14BA-354A-8C2D-CC3DECC21493}" type="datetime1">
               <a:rPr lang="en-US" smtClean="0"/>
-              <a:t>12/5/12</a:t>
+              <a:pPr/>
+              <a:t>12/6/12</a:t>
             </a:fld>
             <a:endParaRPr lang="en-US"/>
           </a:p>
@@ -7644,7 +9085,8 @@
           <a:p>
             <a:fld id="{E0DE04BD-8658-D748-AC68-FF6602B4805B}" type="datetime1">
               <a:rPr lang="en-US" smtClean="0"/>
-              <a:t>12/5/12</a:t>
+              <a:pPr/>
+              <a:t>12/6/12</a:t>
             </a:fld>
             <a:endParaRPr lang="en-US"/>
           </a:p>
@@ -7893,7 +9335,8 @@
           <a:p>
             <a:fld id="{219DC1AB-02DC-6D4D-B99E-106076FACECE}" type="datetime1">
               <a:rPr lang="en-US" smtClean="0"/>
-              <a:t>12/5/12</a:t>
+              <a:pPr/>
+              <a:t>12/6/12</a:t>
             </a:fld>
             <a:endParaRPr lang="en-US"/>
           </a:p>
@@ -8102,7 +9545,8 @@
           <a:p>
             <a:fld id="{5BA21E0D-E593-0247-976C-92756E0605C8}" type="datetime1">
               <a:rPr lang="en-US" smtClean="0"/>
-              <a:t>12/5/12</a:t>
+              <a:pPr/>
+              <a:t>12/6/12</a:t>
             </a:fld>
             <a:endParaRPr lang="en-US"/>
           </a:p>
@@ -8514,11 +9958,7 @@
           <a:p>
             <a:r>
               <a:rPr lang="en-US" dirty="0" smtClean="0"/>
-              <a:t>Kristal </a:t>
-            </a:r>
-            <a:r>
-              <a:rPr lang="en-US" dirty="0" smtClean="0"/>
-              <a:t>Curtis</a:t>
+              <a:t>Kristal Curtis</a:t>
             </a:r>
           </a:p>
           <a:p>
@@ -8594,7 +10034,7 @@
           <p:nvPr>
             <p:extLst>
               <p:ext uri="{D42A27DB-BD31-4B8C-83A1-F6EECF244321}">
-                <p14:modId xmlns:mc="http://schemas.openxmlformats.org/markup-compatibility/2006" xmlns:mv="urn:schemas-microsoft-com:mac:vml" xmlns:p14="http://schemas.microsoft.com/office/powerpoint/2010/main" xmlns:p="http://schemas.openxmlformats.org/presentationml/2006/main" xmlns:r="http://schemas.openxmlformats.org/officeDocument/2006/relationships" xmlns:a="http://schemas.openxmlformats.org/drawingml/2006/main" xmlns="" val="465859062"/>
+                <p14:modId xmlns="" xmlns:a="http://schemas.openxmlformats.org/drawingml/2006/main" xmlns:r="http://schemas.openxmlformats.org/officeDocument/2006/relationships" xmlns:p="http://schemas.openxmlformats.org/presentationml/2006/main" xmlns:p14="http://schemas.microsoft.com/office/powerpoint/2010/main" xmlns:mv="urn:schemas-microsoft-com:mac:vml" xmlns:mc="http://schemas.openxmlformats.org/markup-compatibility/2006" val="465859062"/>
               </p:ext>
             </p:extLst>
           </p:nvPr>
@@ -9143,7 +10583,6 @@
               <a:rPr lang="en-US" dirty="0" smtClean="0"/>
               <a:t>Motivation</a:t>
             </a:r>
-            <a:endParaRPr lang="en-US" dirty="0" smtClean="0"/>
           </a:p>
           <a:p>
             <a:r>
@@ -9158,15 +10597,7 @@
                   <a:srgbClr val="3366FF"/>
                 </a:solidFill>
               </a:rPr>
-              <a:t>Problem</a:t>
-            </a:r>
-            <a:r>
-              <a:rPr lang="en-US" dirty="0" smtClean="0">
-                <a:solidFill>
-                  <a:srgbClr val="3366FF"/>
-                </a:solidFill>
-              </a:rPr>
-              <a:t>:  Similarity</a:t>
+              <a:t>Problem:  Similarity</a:t>
             </a:r>
           </a:p>
           <a:p>
@@ -9366,7 +10797,7 @@
     </p:spTree>
     <p:extLst>
       <p:ext uri="{BB962C8B-B14F-4D97-AF65-F5344CB8AC3E}">
-        <p14:creationId xmlns="" xmlns:a="http://schemas.openxmlformats.org/drawingml/2006/main" xmlns:r="http://schemas.openxmlformats.org/officeDocument/2006/relationships" xmlns:p="http://schemas.openxmlformats.org/presentationml/2006/main" xmlns:p14="http://schemas.microsoft.com/office/powerpoint/2010/main" xmlns:mv="urn:schemas-microsoft-com:mac:vml" xmlns:mc="http://schemas.openxmlformats.org/markup-compatibility/2006" val="1535462898"/>
+        <p14:creationId xmlns:mc="http://schemas.openxmlformats.org/markup-compatibility/2006" xmlns:mv="urn:schemas-microsoft-com:mac:vml" xmlns:p14="http://schemas.microsoft.com/office/powerpoint/2010/main" xmlns:p="http://schemas.openxmlformats.org/presentationml/2006/main" xmlns:r="http://schemas.openxmlformats.org/officeDocument/2006/relationships" xmlns:a="http://schemas.openxmlformats.org/drawingml/2006/main" xmlns="" val="1535462898"/>
       </p:ext>
     </p:extLst>
   </p:cSld>
@@ -9584,13 +11015,8 @@
           <a:p>
             <a:r>
               <a:rPr lang="en-US" dirty="0" smtClean="0"/>
-              <a:t>Most of the challenge in alignment comes from the genome’s </a:t>
-            </a:r>
-            <a:r>
-              <a:rPr lang="en-US" dirty="0" smtClean="0"/>
-              <a:t>redundancy</a:t>
-            </a:r>
-            <a:endParaRPr lang="en-US" dirty="0" smtClean="0"/>
+              <a:t>Most of the challenge in alignment comes from the genome’s redundancy</a:t>
+            </a:r>
           </a:p>
         </p:txBody>
       </p:sp>
@@ -9847,7 +11273,7 @@
         </p:xfrm>
         <a:graphic>
           <a:graphicData uri="http://schemas.openxmlformats.org/drawingml/2006/chart">
-            <c:chart xmlns:c="http://schemas.openxmlformats.org/drawingml/2006/chart" xmlns:r="http://schemas.openxmlformats.org/officeDocument/2006/relationships" r:id="rId2"/>
+            <c:chart xmlns:c="http://schemas.openxmlformats.org/drawingml/2006/chart" xmlns:r="http://schemas.openxmlformats.org/officeDocument/2006/relationships" r:id="rId3"/>
           </a:graphicData>
         </a:graphic>
       </p:graphicFrame>
@@ -9867,7 +11293,7 @@
         </p:xfrm>
         <a:graphic>
           <a:graphicData uri="http://schemas.openxmlformats.org/drawingml/2006/chart">
-            <c:chart xmlns:c="http://schemas.openxmlformats.org/drawingml/2006/chart" xmlns:r="http://schemas.openxmlformats.org/officeDocument/2006/relationships" r:id="rId3"/>
+            <c:chart xmlns:c="http://schemas.openxmlformats.org/drawingml/2006/chart" xmlns:r="http://schemas.openxmlformats.org/officeDocument/2006/relationships" r:id="rId4"/>
           </a:graphicData>
         </a:graphic>
       </p:graphicFrame>
@@ -9958,13 +11384,8 @@
             <a:pPr algn="ctr"/>
             <a:r>
               <a:rPr lang="en-US" sz="2800" dirty="0" smtClean="0"/>
-              <a:t>Setup:  aligned 1e6 simulated reads to hg19 with </a:t>
-            </a:r>
-            <a:r>
-              <a:rPr lang="en-US" sz="2800" dirty="0" smtClean="0"/>
-              <a:t>SNAP</a:t>
-            </a:r>
-            <a:endParaRPr lang="en-US" sz="2800" dirty="0" smtClean="0"/>
+              <a:t>Setup:  aligned 1e6 simulated reads to hg19 with SNAP</a:t>
+            </a:r>
           </a:p>
         </p:txBody>
       </p:sp>
@@ -10283,11 +11704,7 @@
           <a:p>
             <a:r>
               <a:rPr lang="en-US" dirty="0" smtClean="0"/>
-              <a:t>Relies on intrinsic evaluation </a:t>
-            </a:r>
-            <a:r>
-              <a:rPr lang="en-US" dirty="0" smtClean="0"/>
-              <a:t>criteria</a:t>
+              <a:t>Relies on intrinsic evaluation criteria</a:t>
             </a:r>
             <a:endParaRPr lang="en-US" dirty="0"/>
           </a:p>
@@ -15370,7 +16787,7 @@
           <a:blip r:embed="rId3">
             <a:extLst>
               <a:ext uri="{28A0092B-C50C-407E-A947-70E740481C1C}">
-                <a14:useLocalDpi xmlns:mc="http://schemas.openxmlformats.org/markup-compatibility/2006" xmlns:mv="urn:schemas-microsoft-com:mac:vml" xmlns:a14="http://schemas.microsoft.com/office/drawing/2010/main" xmlns:p="http://schemas.openxmlformats.org/presentationml/2006/main" xmlns:r="http://schemas.openxmlformats.org/officeDocument/2006/relationships" xmlns:a="http://schemas.openxmlformats.org/drawingml/2006/main" xmlns="" val="0"/>
+                <a14:useLocalDpi xmlns="" xmlns:a="http://schemas.openxmlformats.org/drawingml/2006/main" xmlns:r="http://schemas.openxmlformats.org/officeDocument/2006/relationships" xmlns:p="http://schemas.openxmlformats.org/presentationml/2006/main" xmlns:a14="http://schemas.microsoft.com/office/drawing/2010/main" xmlns:mv="urn:schemas-microsoft-com:mac:vml" xmlns:mc="http://schemas.openxmlformats.org/markup-compatibility/2006" val="0"/>
               </a:ext>
             </a:extLst>
           </a:blip>
@@ -15475,7 +16892,7 @@
     </p:spTree>
     <p:extLst>
       <p:ext uri="{BB962C8B-B14F-4D97-AF65-F5344CB8AC3E}">
-        <p14:creationId xmlns:mc="http://schemas.openxmlformats.org/markup-compatibility/2006" xmlns:mv="urn:schemas-microsoft-com:mac:vml" xmlns:p14="http://schemas.microsoft.com/office/powerpoint/2010/main" xmlns:p="http://schemas.openxmlformats.org/presentationml/2006/main" xmlns:r="http://schemas.openxmlformats.org/officeDocument/2006/relationships" xmlns:a="http://schemas.openxmlformats.org/drawingml/2006/main" xmlns="" val="2317773805"/>
+        <p14:creationId xmlns="" xmlns:a="http://schemas.openxmlformats.org/drawingml/2006/main" xmlns:r="http://schemas.openxmlformats.org/officeDocument/2006/relationships" xmlns:p="http://schemas.openxmlformats.org/presentationml/2006/main" xmlns:p14="http://schemas.microsoft.com/office/powerpoint/2010/main" xmlns:mv="urn:schemas-microsoft-com:mac:vml" xmlns:mc="http://schemas.openxmlformats.org/markup-compatibility/2006" val="2317773805"/>
       </p:ext>
     </p:extLst>
   </p:cSld>
@@ -15951,7 +17368,6 @@
               <a:rPr lang="en-US" dirty="0" smtClean="0"/>
               <a:t>Motivation</a:t>
             </a:r>
-            <a:endParaRPr lang="en-US" dirty="0" smtClean="0"/>
           </a:p>
           <a:p>
             <a:r>
@@ -15962,11 +17378,7 @@
           <a:p>
             <a:r>
               <a:rPr lang="en-US" dirty="0" smtClean="0"/>
-              <a:t>Problem</a:t>
-            </a:r>
-            <a:r>
-              <a:rPr lang="en-US" dirty="0" smtClean="0"/>
-              <a:t>:  Similarity</a:t>
+              <a:t>Problem:  Similarity</a:t>
             </a:r>
           </a:p>
           <a:p>
@@ -17870,7 +19282,7 @@
     </p:spTree>
     <p:extLst>
       <p:ext uri="{BB962C8B-B14F-4D97-AF65-F5344CB8AC3E}">
-        <p14:creationId xmlns="" xmlns:a="http://schemas.openxmlformats.org/drawingml/2006/main" xmlns:r="http://schemas.openxmlformats.org/officeDocument/2006/relationships" xmlns:p="http://schemas.openxmlformats.org/presentationml/2006/main" xmlns:p14="http://schemas.microsoft.com/office/powerpoint/2010/main" xmlns:mv="urn:schemas-microsoft-com:mac:vml" xmlns:mc="http://schemas.openxmlformats.org/markup-compatibility/2006" val="3914231263"/>
+        <p14:creationId xmlns:mc="http://schemas.openxmlformats.org/markup-compatibility/2006" xmlns:mv="urn:schemas-microsoft-com:mac:vml" xmlns:p14="http://schemas.microsoft.com/office/powerpoint/2010/main" xmlns:p="http://schemas.openxmlformats.org/presentationml/2006/main" xmlns:r="http://schemas.openxmlformats.org/officeDocument/2006/relationships" xmlns:a="http://schemas.openxmlformats.org/drawingml/2006/main" xmlns="" val="3914231263"/>
       </p:ext>
     </p:extLst>
   </p:cSld>
@@ -18170,7 +19582,7 @@
     </p:spTree>
     <p:extLst>
       <p:ext uri="{BB962C8B-B14F-4D97-AF65-F5344CB8AC3E}">
-        <p14:creationId xmlns="" xmlns:a="http://schemas.openxmlformats.org/drawingml/2006/main" xmlns:r="http://schemas.openxmlformats.org/officeDocument/2006/relationships" xmlns:p="http://schemas.openxmlformats.org/presentationml/2006/main" xmlns:p14="http://schemas.microsoft.com/office/powerpoint/2010/main" xmlns:mv="urn:schemas-microsoft-com:mac:vml" xmlns:mc="http://schemas.openxmlformats.org/markup-compatibility/2006" val="58810801"/>
+        <p14:creationId xmlns:mc="http://schemas.openxmlformats.org/markup-compatibility/2006" xmlns:mv="urn:schemas-microsoft-com:mac:vml" xmlns:p14="http://schemas.microsoft.com/office/powerpoint/2010/main" xmlns:p="http://schemas.openxmlformats.org/presentationml/2006/main" xmlns:r="http://schemas.openxmlformats.org/officeDocument/2006/relationships" xmlns:a="http://schemas.openxmlformats.org/drawingml/2006/main" xmlns="" val="58810801"/>
       </p:ext>
     </p:extLst>
   </p:cSld>
@@ -20455,7 +21867,7 @@
     </p:spTree>
     <p:extLst>
       <p:ext uri="{BB962C8B-B14F-4D97-AF65-F5344CB8AC3E}">
-        <p14:creationId xmlns="" xmlns:a="http://schemas.openxmlformats.org/drawingml/2006/main" xmlns:r="http://schemas.openxmlformats.org/officeDocument/2006/relationships" xmlns:p="http://schemas.openxmlformats.org/presentationml/2006/main" xmlns:p14="http://schemas.microsoft.com/office/powerpoint/2010/main" xmlns:mv="urn:schemas-microsoft-com:mac:vml" xmlns:mc="http://schemas.openxmlformats.org/markup-compatibility/2006" val="131646654"/>
+        <p14:creationId xmlns:mc="http://schemas.openxmlformats.org/markup-compatibility/2006" xmlns:mv="urn:schemas-microsoft-com:mac:vml" xmlns:p14="http://schemas.microsoft.com/office/powerpoint/2010/main" xmlns:p="http://schemas.openxmlformats.org/presentationml/2006/main" xmlns:r="http://schemas.openxmlformats.org/officeDocument/2006/relationships" xmlns:a="http://schemas.openxmlformats.org/drawingml/2006/main" xmlns="" val="131646654"/>
       </p:ext>
     </p:extLst>
   </p:cSld>
@@ -21871,7 +23283,6 @@
               <a:rPr lang="en-US" dirty="0" smtClean="0"/>
               <a:t>Difficult algorithmic, systems, and ML problems to accurately put together DNA short read data</a:t>
             </a:r>
-            <a:endParaRPr lang="en-US" dirty="0" smtClean="0"/>
           </a:p>
           <a:p>
             <a:r>
@@ -22181,7 +23592,7 @@
     </p:spTree>
     <p:extLst>
       <p:ext uri="{BB962C8B-B14F-4D97-AF65-F5344CB8AC3E}">
-        <p14:creationId xmlns:mc="http://schemas.openxmlformats.org/markup-compatibility/2006" xmlns:mv="urn:schemas-microsoft-com:mac:vml" xmlns:p14="http://schemas.microsoft.com/office/powerpoint/2010/main" xmlns:p="http://schemas.openxmlformats.org/presentationml/2006/main" xmlns:r="http://schemas.openxmlformats.org/officeDocument/2006/relationships" xmlns:a="http://schemas.openxmlformats.org/drawingml/2006/main" xmlns="" val="585510965"/>
+        <p14:creationId xmlns="" xmlns:a="http://schemas.openxmlformats.org/drawingml/2006/main" xmlns:r="http://schemas.openxmlformats.org/officeDocument/2006/relationships" xmlns:p="http://schemas.openxmlformats.org/presentationml/2006/main" xmlns:p14="http://schemas.microsoft.com/office/powerpoint/2010/main" xmlns:mv="urn:schemas-microsoft-com:mac:vml" xmlns:mc="http://schemas.openxmlformats.org/markup-compatibility/2006" val="585510965"/>
       </p:ext>
     </p:extLst>
   </p:cSld>
@@ -23476,7 +24887,7 @@
           <p:nvPr>
             <p:extLst>
               <p:ext uri="{D42A27DB-BD31-4B8C-83A1-F6EECF244321}">
-                <p14:modId xmlns:mc="http://schemas.openxmlformats.org/markup-compatibility/2006" xmlns:mv="urn:schemas-microsoft-com:mac:vml" xmlns:p14="http://schemas.microsoft.com/office/powerpoint/2010/main" xmlns:p="http://schemas.openxmlformats.org/presentationml/2006/main" xmlns:r="http://schemas.openxmlformats.org/officeDocument/2006/relationships" xmlns:a="http://schemas.openxmlformats.org/drawingml/2006/main" xmlns="" val="465859062"/>
+                <p14:modId xmlns="" xmlns:a="http://schemas.openxmlformats.org/drawingml/2006/main" xmlns:r="http://schemas.openxmlformats.org/officeDocument/2006/relationships" xmlns:p="http://schemas.openxmlformats.org/presentationml/2006/main" xmlns:p14="http://schemas.microsoft.com/office/powerpoint/2010/main" xmlns:mv="urn:schemas-microsoft-com:mac:vml" xmlns:mc="http://schemas.openxmlformats.org/markup-compatibility/2006" val="465859062"/>
               </p:ext>
             </p:extLst>
           </p:nvPr>
@@ -23986,7 +25397,6 @@
               <a:rPr lang="en-US" dirty="0" smtClean="0"/>
               <a:t>Motivation</a:t>
             </a:r>
-            <a:endParaRPr lang="en-US" dirty="0" smtClean="0"/>
           </a:p>
           <a:p>
             <a:r>
@@ -23997,11 +25407,7 @@
           <a:p>
             <a:r>
               <a:rPr lang="en-US" dirty="0" smtClean="0"/>
-              <a:t>Problem</a:t>
-            </a:r>
-            <a:r>
-              <a:rPr lang="en-US" dirty="0" smtClean="0"/>
-              <a:t>:  Similarity</a:t>
+              <a:t>Problem:  Similarity</a:t>
             </a:r>
           </a:p>
           <a:p>
@@ -24775,15 +26181,7 @@
             </a:r>
             <a:r>
               <a:rPr lang="en-US" dirty="0" smtClean="0"/>
-              <a:t> [</a:t>
-            </a:r>
-            <a:r>
-              <a:rPr lang="en-US" dirty="0" smtClean="0"/>
-              <a:t>Lunter10]</a:t>
-            </a:r>
-            <a:r>
-              <a:rPr lang="en-US" dirty="0" smtClean="0"/>
-              <a:t>)</a:t>
+              <a:t> [Lunter10])</a:t>
             </a:r>
           </a:p>
           <a:p>
@@ -27394,21 +28792,13 @@
           <a:p>
             <a:r>
               <a:rPr lang="en-US" dirty="0" smtClean="0"/>
-              <a:t>Leveraging prior knowledge about the genome’s structure leads to improved alignment </a:t>
-            </a:r>
+              <a:t>Leveraging prior knowledge about the genome’s structure leads to improved alignment performance</a:t>
+            </a:r>
+          </a:p>
+          <a:p>
             <a:r>
               <a:rPr lang="en-US" dirty="0" smtClean="0"/>
-              <a:t>performance</a:t>
-            </a:r>
-          </a:p>
-          <a:p>
-            <a:r>
-              <a:rPr lang="en-US" dirty="0" smtClean="0"/>
-              <a:t>These </a:t>
-            </a:r>
-            <a:r>
-              <a:rPr lang="en-US" dirty="0" smtClean="0"/>
-              <a:t>gains will improve subsequent variant calling, leading to better decisions</a:t>
+              <a:t>These gains will improve subsequent variant calling, leading to better decisions</a:t>
             </a:r>
             <a:endParaRPr lang="en-US" dirty="0"/>
           </a:p>
@@ -27742,7 +29132,6 @@
               <a:rPr lang="en-US" sz="1400" dirty="0" smtClean="0"/>
               <a:t>, 41(10), 1061-1067.</a:t>
             </a:r>
-            <a:endParaRPr lang="en-US" sz="1400" dirty="0" smtClean="0"/>
           </a:p>
           <a:p>
             <a:pPr>
@@ -27775,11 +29164,7 @@
             </a:pPr>
             <a:r>
               <a:rPr lang="en-US" sz="1400" dirty="0" smtClean="0"/>
-              <a:t>[</a:t>
-            </a:r>
-            <a:r>
-              <a:rPr lang="en-US" sz="1400" dirty="0" smtClean="0"/>
-              <a:t>Bao02]  Z. </a:t>
+              <a:t>[Bao02]  Z. </a:t>
             </a:r>
             <a:r>
               <a:rPr lang="en-US" sz="1400" dirty="0" err="1" smtClean="0"/>
@@ -27952,13 +29337,8 @@
             </a:r>
             <a:r>
               <a:rPr lang="en-US" sz="1400" dirty="0" smtClean="0"/>
-              <a:t>, 9(4), 357-359</a:t>
-            </a:r>
-            <a:r>
-              <a:rPr lang="en-US" sz="1400" dirty="0" smtClean="0"/>
-              <a:t>.</a:t>
-            </a:r>
-            <a:endParaRPr lang="en-US" sz="1400" dirty="0" smtClean="0"/>
+              <a:t>, 9(4), 357-359.</a:t>
+            </a:r>
           </a:p>
         </p:txBody>
       </p:sp>
@@ -28088,11 +29468,7 @@
             </a:pPr>
             <a:r>
               <a:rPr lang="en-US" sz="1400" dirty="0" smtClean="0"/>
-              <a:t>[</a:t>
-            </a:r>
-            <a:r>
-              <a:rPr lang="en-US" sz="1400" dirty="0" smtClean="0"/>
-              <a:t>H.Li09]  H. Li and R. Durbin.  Fast and accurate short read alignment with Burrows-Wheeler transform.  </a:t>
+              <a:t>[H.Li09]  H. Li and R. Durbin.  Fast and accurate short read alignment with Burrows-Wheeler transform.  </a:t>
             </a:r>
             <a:r>
               <a:rPr lang="en-US" sz="1400" i="1" dirty="0" smtClean="0"/>
@@ -28134,15 +29510,7 @@
             </a:pPr>
             <a:r>
               <a:rPr lang="en-US" sz="1400" dirty="0" smtClean="0"/>
-              <a:t>[</a:t>
-            </a:r>
-            <a:r>
-              <a:rPr lang="en-US" sz="1400" dirty="0" smtClean="0"/>
-              <a:t>Lunter10]  </a:t>
-            </a:r>
-            <a:r>
-              <a:rPr lang="en-US" sz="1400" dirty="0" smtClean="0"/>
-              <a:t>G. </a:t>
+              <a:t>[Lunter10]  G. </a:t>
             </a:r>
             <a:r>
               <a:rPr lang="en-US" sz="1400" dirty="0" err="1" smtClean="0"/>
@@ -30270,7 +31638,7 @@
     </p:spTree>
     <p:extLst>
       <p:ext uri="{BB962C8B-B14F-4D97-AF65-F5344CB8AC3E}">
-        <p14:creationId xmlns:mc="http://schemas.openxmlformats.org/markup-compatibility/2006" xmlns:mv="urn:schemas-microsoft-com:mac:vml" xmlns:p14="http://schemas.microsoft.com/office/powerpoint/2010/main" xmlns:p="http://schemas.openxmlformats.org/presentationml/2006/main" xmlns:r="http://schemas.openxmlformats.org/officeDocument/2006/relationships" xmlns:a="http://schemas.openxmlformats.org/drawingml/2006/main" xmlns="" val="1394716155"/>
+        <p14:creationId xmlns="" xmlns:a="http://schemas.openxmlformats.org/drawingml/2006/main" xmlns:r="http://schemas.openxmlformats.org/officeDocument/2006/relationships" xmlns:p="http://schemas.openxmlformats.org/presentationml/2006/main" xmlns:p14="http://schemas.microsoft.com/office/powerpoint/2010/main" xmlns:mv="urn:schemas-microsoft-com:mac:vml" xmlns:mc="http://schemas.openxmlformats.org/markup-compatibility/2006" val="1394716155"/>
       </p:ext>
     </p:extLst>
   </p:cSld>
@@ -31744,7 +33112,7 @@
     </p:spTree>
     <p:extLst>
       <p:ext uri="{BB962C8B-B14F-4D97-AF65-F5344CB8AC3E}">
-        <p14:creationId xmlns:mc="http://schemas.openxmlformats.org/markup-compatibility/2006" xmlns:mv="urn:schemas-microsoft-com:mac:vml" xmlns:p14="http://schemas.microsoft.com/office/powerpoint/2010/main" xmlns:p="http://schemas.openxmlformats.org/presentationml/2006/main" xmlns:r="http://schemas.openxmlformats.org/officeDocument/2006/relationships" xmlns:a="http://schemas.openxmlformats.org/drawingml/2006/main" xmlns="" val="155552780"/>
+        <p14:creationId xmlns="" xmlns:a="http://schemas.openxmlformats.org/drawingml/2006/main" xmlns:r="http://schemas.openxmlformats.org/officeDocument/2006/relationships" xmlns:p="http://schemas.openxmlformats.org/presentationml/2006/main" xmlns:p14="http://schemas.microsoft.com/office/powerpoint/2010/main" xmlns:mv="urn:schemas-microsoft-com:mac:vml" xmlns:mc="http://schemas.openxmlformats.org/markup-compatibility/2006" val="155552780"/>
       </p:ext>
     </p:extLst>
   </p:cSld>
@@ -33011,7 +34379,7 @@
     </p:spTree>
     <p:extLst>
       <p:ext uri="{BB962C8B-B14F-4D97-AF65-F5344CB8AC3E}">
-        <p14:creationId xmlns:mc="http://schemas.openxmlformats.org/markup-compatibility/2006" xmlns:mv="urn:schemas-microsoft-com:mac:vml" xmlns:p14="http://schemas.microsoft.com/office/powerpoint/2010/main" xmlns:p="http://schemas.openxmlformats.org/presentationml/2006/main" xmlns:r="http://schemas.openxmlformats.org/officeDocument/2006/relationships" xmlns:a="http://schemas.openxmlformats.org/drawingml/2006/main" xmlns="" val="336287415"/>
+        <p14:creationId xmlns="" xmlns:a="http://schemas.openxmlformats.org/drawingml/2006/main" xmlns:r="http://schemas.openxmlformats.org/officeDocument/2006/relationships" xmlns:p="http://schemas.openxmlformats.org/presentationml/2006/main" xmlns:p14="http://schemas.microsoft.com/office/powerpoint/2010/main" xmlns:mv="urn:schemas-microsoft-com:mac:vml" xmlns:mc="http://schemas.openxmlformats.org/markup-compatibility/2006" val="336287415"/>
       </p:ext>
     </p:extLst>
   </p:cSld>
@@ -33484,7 +34852,7 @@
     </p:spTree>
     <p:extLst>
       <p:ext uri="{BB962C8B-B14F-4D97-AF65-F5344CB8AC3E}">
-        <p14:creationId xmlns:mc="http://schemas.openxmlformats.org/markup-compatibility/2006" xmlns:mv="urn:schemas-microsoft-com:mac:vml" xmlns:p14="http://schemas.microsoft.com/office/powerpoint/2010/main" xmlns:p="http://schemas.openxmlformats.org/presentationml/2006/main" xmlns:r="http://schemas.openxmlformats.org/officeDocument/2006/relationships" xmlns:a="http://schemas.openxmlformats.org/drawingml/2006/main" xmlns="" val="1975635498"/>
+        <p14:creationId xmlns="" xmlns:a="http://schemas.openxmlformats.org/drawingml/2006/main" xmlns:r="http://schemas.openxmlformats.org/officeDocument/2006/relationships" xmlns:p="http://schemas.openxmlformats.org/presentationml/2006/main" xmlns:p14="http://schemas.microsoft.com/office/powerpoint/2010/main" xmlns:mv="urn:schemas-microsoft-com:mac:vml" xmlns:mc="http://schemas.openxmlformats.org/markup-compatibility/2006" val="1975635498"/>
       </p:ext>
     </p:extLst>
   </p:cSld>
@@ -33591,7 +34959,6 @@
               <a:rPr lang="en-US" dirty="0" smtClean="0"/>
               <a:t> [Volfovsky01]</a:t>
             </a:r>
-            <a:endParaRPr lang="en-US" dirty="0" smtClean="0"/>
           </a:p>
           <a:p>
             <a:pPr lvl="1"/>
@@ -33722,7 +35089,6 @@
               <a:rPr lang="en-US" dirty="0" smtClean="0"/>
               <a:t>Motivation</a:t>
             </a:r>
-            <a:endParaRPr lang="en-US" dirty="0" smtClean="0"/>
           </a:p>
           <a:p>
             <a:r>
@@ -33737,11 +35103,7 @@
           <a:p>
             <a:r>
               <a:rPr lang="en-US" dirty="0" smtClean="0"/>
-              <a:t>Problem</a:t>
-            </a:r>
-            <a:r>
-              <a:rPr lang="en-US" dirty="0" smtClean="0"/>
-              <a:t>:  Similarity</a:t>
+              <a:t>Problem:  Similarity</a:t>
             </a:r>
           </a:p>
           <a:p>
@@ -34785,7 +36147,7 @@
     </p:spTree>
     <p:extLst>
       <p:ext uri="{BB962C8B-B14F-4D97-AF65-F5344CB8AC3E}">
-        <p14:creationId xmlns:mc="http://schemas.openxmlformats.org/markup-compatibility/2006" xmlns:mv="urn:schemas-microsoft-com:mac:vml" xmlns:p14="http://schemas.microsoft.com/office/powerpoint/2010/main" xmlns:p="http://schemas.openxmlformats.org/presentationml/2006/main" xmlns:r="http://schemas.openxmlformats.org/officeDocument/2006/relationships" xmlns:a="http://schemas.openxmlformats.org/drawingml/2006/main" xmlns="" val="3825052853"/>
+        <p14:creationId xmlns="" xmlns:a="http://schemas.openxmlformats.org/drawingml/2006/main" xmlns:r="http://schemas.openxmlformats.org/officeDocument/2006/relationships" xmlns:p="http://schemas.openxmlformats.org/presentationml/2006/main" xmlns:p14="http://schemas.microsoft.com/office/powerpoint/2010/main" xmlns:mv="urn:schemas-microsoft-com:mac:vml" xmlns:mc="http://schemas.openxmlformats.org/markup-compatibility/2006" val="3825052853"/>
       </p:ext>
     </p:extLst>
   </p:cSld>
@@ -34930,21 +36292,13 @@
           <a:p>
             <a:r>
               <a:rPr lang="en-US" dirty="0" smtClean="0"/>
-              <a:t>Scalable Nucleotide Alignment </a:t>
-            </a:r>
+              <a:t>Scalable Nucleotide Alignment Program</a:t>
+            </a:r>
+          </a:p>
+          <a:p>
             <a:r>
               <a:rPr lang="en-US" dirty="0" smtClean="0"/>
-              <a:t>Program</a:t>
-            </a:r>
-          </a:p>
-          <a:p>
-            <a:r>
-              <a:rPr lang="en-US" dirty="0" smtClean="0"/>
-              <a:t>Over 10x </a:t>
-            </a:r>
-            <a:r>
-              <a:rPr lang="en-US" dirty="0" smtClean="0"/>
-              <a:t>faster than current tools</a:t>
+              <a:t>Over 10x faster than current tools</a:t>
             </a:r>
           </a:p>
           <a:p>
@@ -35126,7 +36480,7 @@
     </p:spTree>
     <p:extLst>
       <p:ext uri="{BB962C8B-B14F-4D97-AF65-F5344CB8AC3E}">
-        <p14:creationId xmlns:mc="http://schemas.openxmlformats.org/markup-compatibility/2006" xmlns:mv="urn:schemas-microsoft-com:mac:vml" xmlns:p14="http://schemas.microsoft.com/office/powerpoint/2010/main" xmlns:p="http://schemas.openxmlformats.org/presentationml/2006/main" xmlns:r="http://schemas.openxmlformats.org/officeDocument/2006/relationships" xmlns:a="http://schemas.openxmlformats.org/drawingml/2006/main" xmlns="" val="3868249374"/>
+        <p14:creationId xmlns="" xmlns:a="http://schemas.openxmlformats.org/drawingml/2006/main" xmlns:r="http://schemas.openxmlformats.org/officeDocument/2006/relationships" xmlns:p="http://schemas.openxmlformats.org/presentationml/2006/main" xmlns:p14="http://schemas.microsoft.com/office/powerpoint/2010/main" xmlns:mv="urn:schemas-microsoft-com:mac:vml" xmlns:mc="http://schemas.openxmlformats.org/markup-compatibility/2006" val="3868249374"/>
       </p:ext>
     </p:extLst>
   </p:cSld>
@@ -35341,11 +36695,7 @@
             <a:pPr lvl="1"/>
             <a:r>
               <a:rPr lang="en-US" dirty="0" smtClean="0"/>
-              <a:t>Index </a:t>
-            </a:r>
-            <a:r>
-              <a:rPr lang="en-US" dirty="0" smtClean="0"/>
-              <a:t>substrings of</a:t>
+              <a:t>Index substrings of</a:t>
             </a:r>
             <a:br>
               <a:rPr lang="en-US" dirty="0" smtClean="0"/>
@@ -35392,27 +36742,7 @@
             <a:pPr lvl="1"/>
             <a:r>
               <a:rPr lang="en-US" dirty="0" smtClean="0"/>
-              <a:t>Bowtie2 [</a:t>
-            </a:r>
-            <a:r>
-              <a:rPr lang="en-US" dirty="0" smtClean="0"/>
-              <a:t>Langmead12],</a:t>
-            </a:r>
-            <a:r>
-              <a:rPr lang="en-US" dirty="0" smtClean="0"/>
-              <a:t> BWA [</a:t>
-            </a:r>
-            <a:r>
-              <a:rPr lang="en-US" dirty="0" smtClean="0"/>
-              <a:t>H.Li09],</a:t>
-            </a:r>
-            <a:r>
-              <a:rPr lang="en-US" dirty="0" smtClean="0"/>
-              <a:t> SOAP2 [</a:t>
-            </a:r>
-            <a:r>
-              <a:rPr lang="en-US" dirty="0" smtClean="0"/>
-              <a:t>R.Li09]</a:t>
+              <a:t>Bowtie2 [Langmead12], BWA [H.Li09], SOAP2 [R.Li09]</a:t>
             </a:r>
           </a:p>
           <a:p>
@@ -35473,7 +36803,7 @@
           <p:nvPr>
             <p:extLst>
               <p:ext uri="{D42A27DB-BD31-4B8C-83A1-F6EECF244321}">
-                <p14:modId xmlns:mc="http://schemas.openxmlformats.org/markup-compatibility/2006" xmlns:mv="urn:schemas-microsoft-com:mac:vml" xmlns:p14="http://schemas.microsoft.com/office/powerpoint/2010/main" xmlns:p="http://schemas.openxmlformats.org/presentationml/2006/main" xmlns:r="http://schemas.openxmlformats.org/officeDocument/2006/relationships" xmlns:a="http://schemas.openxmlformats.org/drawingml/2006/main" xmlns="" val="953455250"/>
+                <p14:modId xmlns="" xmlns:a="http://schemas.openxmlformats.org/drawingml/2006/main" xmlns:r="http://schemas.openxmlformats.org/officeDocument/2006/relationships" xmlns:p="http://schemas.openxmlformats.org/presentationml/2006/main" xmlns:p14="http://schemas.microsoft.com/office/powerpoint/2010/main" xmlns:mv="urn:schemas-microsoft-com:mac:vml" xmlns:mc="http://schemas.openxmlformats.org/markup-compatibility/2006" val="953455250"/>
               </p:ext>
             </p:extLst>
           </p:nvPr>
@@ -36635,7 +37965,7 @@
     </p:spTree>
     <p:extLst>
       <p:ext uri="{BB962C8B-B14F-4D97-AF65-F5344CB8AC3E}">
-        <p14:creationId xmlns:mc="http://schemas.openxmlformats.org/markup-compatibility/2006" xmlns:mv="urn:schemas-microsoft-com:mac:vml" xmlns:p14="http://schemas.microsoft.com/office/powerpoint/2010/main" xmlns:p="http://schemas.openxmlformats.org/presentationml/2006/main" xmlns:r="http://schemas.openxmlformats.org/officeDocument/2006/relationships" xmlns:a="http://schemas.openxmlformats.org/drawingml/2006/main" xmlns="" val="2105829494"/>
+        <p14:creationId xmlns="" xmlns:a="http://schemas.openxmlformats.org/drawingml/2006/main" xmlns:r="http://schemas.openxmlformats.org/officeDocument/2006/relationships" xmlns:p="http://schemas.openxmlformats.org/presentationml/2006/main" xmlns:p14="http://schemas.microsoft.com/office/powerpoint/2010/main" xmlns:mv="urn:schemas-microsoft-com:mac:vml" xmlns:mc="http://schemas.openxmlformats.org/markup-compatibility/2006" val="2105829494"/>
       </p:ext>
     </p:extLst>
   </p:cSld>
@@ -37911,11 +39241,7 @@
           <a:p>
             <a:r>
               <a:rPr lang="en-US" dirty="0" smtClean="0"/>
-              <a:t>Resource </a:t>
-            </a:r>
-            <a:r>
-              <a:rPr lang="en-US" dirty="0" smtClean="0"/>
-              <a:t>improvements</a:t>
+              <a:t>Resource improvements</a:t>
             </a:r>
           </a:p>
           <a:p>
@@ -37955,11 +39281,7 @@
             <a:pPr lvl="1"/>
             <a:r>
               <a:rPr lang="en-US" dirty="0" smtClean="0"/>
-              <a:t>Reject most positions without fully computing</a:t>
-            </a:r>
-            <a:r>
-              <a:rPr lang="en-US" dirty="0" smtClean="0"/>
-              <a:t> edit distance</a:t>
+              <a:t>Reject most positions without fully computing edit distance</a:t>
             </a:r>
           </a:p>
         </p:txBody>
@@ -37991,7 +39313,7 @@
     </p:spTree>
     <p:extLst>
       <p:ext uri="{BB962C8B-B14F-4D97-AF65-F5344CB8AC3E}">
-        <p14:creationId xmlns:mc="http://schemas.openxmlformats.org/markup-compatibility/2006" xmlns:mv="urn:schemas-microsoft-com:mac:vml" xmlns:p14="http://schemas.microsoft.com/office/powerpoint/2010/main" xmlns:p="http://schemas.openxmlformats.org/presentationml/2006/main" xmlns:r="http://schemas.openxmlformats.org/officeDocument/2006/relationships" xmlns:a="http://schemas.openxmlformats.org/drawingml/2006/main" xmlns="" val="2917449314"/>
+        <p14:creationId xmlns="" xmlns:a="http://schemas.openxmlformats.org/drawingml/2006/main" xmlns:r="http://schemas.openxmlformats.org/officeDocument/2006/relationships" xmlns:p="http://schemas.openxmlformats.org/presentationml/2006/main" xmlns:p14="http://schemas.microsoft.com/office/powerpoint/2010/main" xmlns:mv="urn:schemas-microsoft-com:mac:vml" xmlns:mc="http://schemas.openxmlformats.org/markup-compatibility/2006" val="2917449314"/>
       </p:ext>
     </p:extLst>
   </p:cSld>

</xml_diff>